<commit_message>
slides for week 4 updated
</commit_message>
<xml_diff>
--- a/cits1003-lecture_slides/CITS1003-4 Threats-exercises.pptx
+++ b/cits1003-lecture_slides/CITS1003-4 Threats-exercises.pptx
@@ -5,7 +5,7 @@
     <p:sldMasterId id="2147483763" r:id="rId1"/>
   </p:sldMasterIdLst>
   <p:notesMasterIdLst>
-    <p:notesMasterId r:id="rId61"/>
+    <p:notesMasterId r:id="rId63"/>
   </p:notesMasterIdLst>
   <p:sldIdLst>
     <p:sldId id="256" r:id="rId2"/>
@@ -56,17 +56,19 @@
     <p:sldId id="514" r:id="rId47"/>
     <p:sldId id="1517" r:id="rId48"/>
     <p:sldId id="1518" r:id="rId49"/>
-    <p:sldId id="1519" r:id="rId50"/>
-    <p:sldId id="553" r:id="rId51"/>
-    <p:sldId id="515" r:id="rId52"/>
-    <p:sldId id="516" r:id="rId53"/>
-    <p:sldId id="346" r:id="rId54"/>
-    <p:sldId id="519" r:id="rId55"/>
-    <p:sldId id="1520" r:id="rId56"/>
-    <p:sldId id="347" r:id="rId57"/>
-    <p:sldId id="518" r:id="rId58"/>
-    <p:sldId id="554" r:id="rId59"/>
-    <p:sldId id="555" r:id="rId60"/>
+    <p:sldId id="1521" r:id="rId50"/>
+    <p:sldId id="1522" r:id="rId51"/>
+    <p:sldId id="1519" r:id="rId52"/>
+    <p:sldId id="553" r:id="rId53"/>
+    <p:sldId id="515" r:id="rId54"/>
+    <p:sldId id="516" r:id="rId55"/>
+    <p:sldId id="346" r:id="rId56"/>
+    <p:sldId id="519" r:id="rId57"/>
+    <p:sldId id="1520" r:id="rId58"/>
+    <p:sldId id="347" r:id="rId59"/>
+    <p:sldId id="518" r:id="rId60"/>
+    <p:sldId id="554" r:id="rId61"/>
+    <p:sldId id="555" r:id="rId62"/>
   </p:sldIdLst>
   <p:sldSz cx="12192000" cy="6858000"/>
   <p:notesSz cx="6858000" cy="9144000"/>
@@ -190,19 +192,19 @@
   <pc:docChgLst>
     <pc:chgData name="张 智" userId="36bdf691fd3510be" providerId="LiveId" clId="{EE2847C8-F971-4969-B5C0-FC1DB060E07D}"/>
     <pc:docChg chg="undo redo custSel addSld delSld modSld sldOrd">
-      <pc:chgData name="张 智" userId="36bdf691fd3510be" providerId="LiveId" clId="{EE2847C8-F971-4969-B5C0-FC1DB060E07D}" dt="2024-03-17T13:43:39.807" v="5266" actId="20577"/>
+      <pc:chgData name="张 智" userId="36bdf691fd3510be" providerId="LiveId" clId="{EE2847C8-F971-4969-B5C0-FC1DB060E07D}" dt="2024-03-18T04:58:27.923" v="8699" actId="20577"/>
       <pc:docMkLst>
         <pc:docMk/>
       </pc:docMkLst>
       <pc:sldChg chg="modNotesTx">
-        <pc:chgData name="张 智" userId="36bdf691fd3510be" providerId="LiveId" clId="{EE2847C8-F971-4969-B5C0-FC1DB060E07D}" dt="2024-03-14T05:05:31.714" v="14" actId="20577"/>
+        <pc:chgData name="张 智" userId="36bdf691fd3510be" providerId="LiveId" clId="{EE2847C8-F971-4969-B5C0-FC1DB060E07D}" dt="2024-03-17T14:09:15.469" v="5269" actId="20577"/>
         <pc:sldMkLst>
           <pc:docMk/>
           <pc:sldMk cId="1077586671" sldId="256"/>
         </pc:sldMkLst>
       </pc:sldChg>
       <pc:sldChg chg="modNotesTx">
-        <pc:chgData name="张 智" userId="36bdf691fd3510be" providerId="LiveId" clId="{EE2847C8-F971-4969-B5C0-FC1DB060E07D}" dt="2024-03-14T04:53:49.491" v="4" actId="20577"/>
+        <pc:chgData name="张 智" userId="36bdf691fd3510be" providerId="LiveId" clId="{EE2847C8-F971-4969-B5C0-FC1DB060E07D}" dt="2024-03-17T14:12:03.336" v="5274"/>
         <pc:sldMkLst>
           <pc:docMk/>
           <pc:sldMk cId="3039451630" sldId="343"/>
@@ -240,10 +242,46 @@
         </pc:picChg>
       </pc:sldChg>
       <pc:sldChg chg="modNotesTx">
-        <pc:chgData name="张 智" userId="36bdf691fd3510be" providerId="LiveId" clId="{EE2847C8-F971-4969-B5C0-FC1DB060E07D}" dt="2024-03-17T13:26:57.045" v="4716" actId="20577"/>
+        <pc:chgData name="张 智" userId="36bdf691fd3510be" providerId="LiveId" clId="{EE2847C8-F971-4969-B5C0-FC1DB060E07D}" dt="2024-03-18T02:04:22.052" v="7660" actId="20577"/>
+        <pc:sldMkLst>
+          <pc:docMk/>
+          <pc:sldMk cId="2809391081" sldId="345"/>
+        </pc:sldMkLst>
+      </pc:sldChg>
+      <pc:sldChg chg="modNotesTx">
+        <pc:chgData name="张 智" userId="36bdf691fd3510be" providerId="LiveId" clId="{EE2847C8-F971-4969-B5C0-FC1DB060E07D}" dt="2024-03-18T04:26:28.657" v="8563" actId="20577"/>
         <pc:sldMkLst>
           <pc:docMk/>
           <pc:sldMk cId="835046270" sldId="346"/>
+        </pc:sldMkLst>
+      </pc:sldChg>
+      <pc:sldChg chg="modSp mod">
+        <pc:chgData name="张 智" userId="36bdf691fd3510be" providerId="LiveId" clId="{EE2847C8-F971-4969-B5C0-FC1DB060E07D}" dt="2024-03-18T04:45:36.654" v="8597" actId="20577"/>
+        <pc:sldMkLst>
+          <pc:docMk/>
+          <pc:sldMk cId="3682485318" sldId="347"/>
+        </pc:sldMkLst>
+        <pc:spChg chg="mod">
+          <ac:chgData name="张 智" userId="36bdf691fd3510be" providerId="LiveId" clId="{EE2847C8-F971-4969-B5C0-FC1DB060E07D}" dt="2024-03-18T04:45:36.654" v="8597" actId="20577"/>
+          <ac:spMkLst>
+            <pc:docMk/>
+            <pc:sldMk cId="3682485318" sldId="347"/>
+            <ac:spMk id="3" creationId="{A063E825-B27E-43D0-A784-C43512E937CF}"/>
+          </ac:spMkLst>
+        </pc:spChg>
+      </pc:sldChg>
+      <pc:sldChg chg="modNotesTx">
+        <pc:chgData name="张 智" userId="36bdf691fd3510be" providerId="LiveId" clId="{EE2847C8-F971-4969-B5C0-FC1DB060E07D}" dt="2024-03-17T14:13:06.463" v="5285" actId="20577"/>
+        <pc:sldMkLst>
+          <pc:docMk/>
+          <pc:sldMk cId="2948547475" sldId="442"/>
+        </pc:sldMkLst>
+      </pc:sldChg>
+      <pc:sldChg chg="modNotesTx">
+        <pc:chgData name="张 智" userId="36bdf691fd3510be" providerId="LiveId" clId="{EE2847C8-F971-4969-B5C0-FC1DB060E07D}" dt="2024-03-17T14:31:05.457" v="5721" actId="20577"/>
+        <pc:sldMkLst>
+          <pc:docMk/>
+          <pc:sldMk cId="730443573" sldId="453"/>
         </pc:sldMkLst>
       </pc:sldChg>
       <pc:sldChg chg="modNotesTx">
@@ -254,13 +292,13 @@
         </pc:sldMkLst>
       </pc:sldChg>
       <pc:sldChg chg="modSp mod modNotesTx">
-        <pc:chgData name="张 智" userId="36bdf691fd3510be" providerId="LiveId" clId="{EE2847C8-F971-4969-B5C0-FC1DB060E07D}" dt="2024-03-17T11:46:25.522" v="3089" actId="20577"/>
+        <pc:chgData name="张 智" userId="36bdf691fd3510be" providerId="LiveId" clId="{EE2847C8-F971-4969-B5C0-FC1DB060E07D}" dt="2024-03-17T14:18:37.383" v="5325" actId="20577"/>
         <pc:sldMkLst>
           <pc:docMk/>
           <pc:sldMk cId="3454318501" sldId="458"/>
         </pc:sldMkLst>
         <pc:spChg chg="mod">
-          <ac:chgData name="张 智" userId="36bdf691fd3510be" providerId="LiveId" clId="{EE2847C8-F971-4969-B5C0-FC1DB060E07D}" dt="2024-03-17T11:45:22.119" v="3088" actId="20577"/>
+          <ac:chgData name="张 智" userId="36bdf691fd3510be" providerId="LiveId" clId="{EE2847C8-F971-4969-B5C0-FC1DB060E07D}" dt="2024-03-17T14:18:13.993" v="5322" actId="20577"/>
           <ac:spMkLst>
             <pc:docMk/>
             <pc:sldMk cId="3454318501" sldId="458"/>
@@ -269,20 +307,20 @@
         </pc:spChg>
       </pc:sldChg>
       <pc:sldChg chg="modNotesTx">
-        <pc:chgData name="张 智" userId="36bdf691fd3510be" providerId="LiveId" clId="{EE2847C8-F971-4969-B5C0-FC1DB060E07D}" dt="2024-03-17T11:41:16.723" v="3087" actId="20577"/>
+        <pc:chgData name="张 智" userId="36bdf691fd3510be" providerId="LiveId" clId="{EE2847C8-F971-4969-B5C0-FC1DB060E07D}" dt="2024-03-17T14:17:54.400" v="5310" actId="20577"/>
         <pc:sldMkLst>
           <pc:docMk/>
           <pc:sldMk cId="1542867268" sldId="459"/>
         </pc:sldMkLst>
       </pc:sldChg>
       <pc:sldChg chg="modSp mod modNotesTx">
-        <pc:chgData name="张 智" userId="36bdf691fd3510be" providerId="LiveId" clId="{EE2847C8-F971-4969-B5C0-FC1DB060E07D}" dt="2024-03-17T11:50:11.795" v="3151"/>
+        <pc:chgData name="张 智" userId="36bdf691fd3510be" providerId="LiveId" clId="{EE2847C8-F971-4969-B5C0-FC1DB060E07D}" dt="2024-03-17T14:23:41.422" v="5614" actId="20577"/>
         <pc:sldMkLst>
           <pc:docMk/>
           <pc:sldMk cId="2311687944" sldId="460"/>
         </pc:sldMkLst>
         <pc:spChg chg="mod">
-          <ac:chgData name="张 智" userId="36bdf691fd3510be" providerId="LiveId" clId="{EE2847C8-F971-4969-B5C0-FC1DB060E07D}" dt="2024-03-17T11:49:44.782" v="3140" actId="20577"/>
+          <ac:chgData name="张 智" userId="36bdf691fd3510be" providerId="LiveId" clId="{EE2847C8-F971-4969-B5C0-FC1DB060E07D}" dt="2024-03-17T14:20:20.578" v="5388" actId="20577"/>
           <ac:spMkLst>
             <pc:docMk/>
             <pc:sldMk cId="2311687944" sldId="460"/>
@@ -306,20 +344,65 @@
         </pc:spChg>
       </pc:sldChg>
       <pc:sldChg chg="modNotesTx">
-        <pc:chgData name="张 智" userId="36bdf691fd3510be" providerId="LiveId" clId="{EE2847C8-F971-4969-B5C0-FC1DB060E07D}" dt="2024-03-16T14:32:37.305" v="2851" actId="20577"/>
+        <pc:chgData name="张 智" userId="36bdf691fd3510be" providerId="LiveId" clId="{EE2847C8-F971-4969-B5C0-FC1DB060E07D}" dt="2024-03-18T01:37:52.181" v="7143" actId="20577"/>
         <pc:sldMkLst>
           <pc:docMk/>
           <pc:sldMk cId="3836867077" sldId="508"/>
         </pc:sldMkLst>
       </pc:sldChg>
+      <pc:sldChg chg="modSp mod modNotesTx">
+        <pc:chgData name="张 智" userId="36bdf691fd3510be" providerId="LiveId" clId="{EE2847C8-F971-4969-B5C0-FC1DB060E07D}" dt="2024-03-18T01:52:31.340" v="7455" actId="15"/>
+        <pc:sldMkLst>
+          <pc:docMk/>
+          <pc:sldMk cId="2617196703" sldId="510"/>
+        </pc:sldMkLst>
+        <pc:spChg chg="mod">
+          <ac:chgData name="张 智" userId="36bdf691fd3510be" providerId="LiveId" clId="{EE2847C8-F971-4969-B5C0-FC1DB060E07D}" dt="2024-03-18T01:52:31.340" v="7455" actId="15"/>
+          <ac:spMkLst>
+            <pc:docMk/>
+            <pc:sldMk cId="2617196703" sldId="510"/>
+            <ac:spMk id="3" creationId="{21E8586B-D9A3-4AE1-A171-491E51F2FAF0}"/>
+          </ac:spMkLst>
+        </pc:spChg>
+      </pc:sldChg>
+      <pc:sldChg chg="modSp mod">
+        <pc:chgData name="张 智" userId="36bdf691fd3510be" providerId="LiveId" clId="{EE2847C8-F971-4969-B5C0-FC1DB060E07D}" dt="2024-03-18T01:52:14.718" v="7453" actId="14100"/>
+        <pc:sldMkLst>
+          <pc:docMk/>
+          <pc:sldMk cId="2826954081" sldId="511"/>
+        </pc:sldMkLst>
+        <pc:spChg chg="mod">
+          <ac:chgData name="张 智" userId="36bdf691fd3510be" providerId="LiveId" clId="{EE2847C8-F971-4969-B5C0-FC1DB060E07D}" dt="2024-03-18T01:52:14.718" v="7453" actId="14100"/>
+          <ac:spMkLst>
+            <pc:docMk/>
+            <pc:sldMk cId="2826954081" sldId="511"/>
+            <ac:spMk id="3" creationId="{21E8586B-D9A3-4AE1-A171-491E51F2FAF0}"/>
+          </ac:spMkLst>
+        </pc:spChg>
+      </pc:sldChg>
+      <pc:sldChg chg="modSp mod modNotesTx">
+        <pc:chgData name="张 智" userId="36bdf691fd3510be" providerId="LiveId" clId="{EE2847C8-F971-4969-B5C0-FC1DB060E07D}" dt="2024-03-18T01:58:22.376" v="7510" actId="20577"/>
+        <pc:sldMkLst>
+          <pc:docMk/>
+          <pc:sldMk cId="3618927795" sldId="512"/>
+        </pc:sldMkLst>
+        <pc:spChg chg="mod">
+          <ac:chgData name="张 智" userId="36bdf691fd3510be" providerId="LiveId" clId="{EE2847C8-F971-4969-B5C0-FC1DB060E07D}" dt="2024-03-18T01:52:41.589" v="7457" actId="14100"/>
+          <ac:spMkLst>
+            <pc:docMk/>
+            <pc:sldMk cId="3618927795" sldId="512"/>
+            <ac:spMk id="3" creationId="{21E8586B-D9A3-4AE1-A171-491E51F2FAF0}"/>
+          </ac:spMkLst>
+        </pc:spChg>
+      </pc:sldChg>
       <pc:sldChg chg="addSp modSp mod modNotesTx">
-        <pc:chgData name="张 智" userId="36bdf691fd3510be" providerId="LiveId" clId="{EE2847C8-F971-4969-B5C0-FC1DB060E07D}" dt="2024-03-17T12:21:57.204" v="3580" actId="20577"/>
+        <pc:chgData name="张 智" userId="36bdf691fd3510be" providerId="LiveId" clId="{EE2847C8-F971-4969-B5C0-FC1DB060E07D}" dt="2024-03-18T02:06:54.734" v="7704" actId="20577"/>
         <pc:sldMkLst>
           <pc:docMk/>
           <pc:sldMk cId="3263746602" sldId="514"/>
         </pc:sldMkLst>
         <pc:spChg chg="add mod">
-          <ac:chgData name="张 智" userId="36bdf691fd3510be" providerId="LiveId" clId="{EE2847C8-F971-4969-B5C0-FC1DB060E07D}" dt="2024-03-17T12:01:36.011" v="3260"/>
+          <ac:chgData name="张 智" userId="36bdf691fd3510be" providerId="LiveId" clId="{EE2847C8-F971-4969-B5C0-FC1DB060E07D}" dt="2024-03-18T02:06:12.025" v="7693" actId="15"/>
           <ac:spMkLst>
             <pc:docMk/>
             <pc:sldMk cId="3263746602" sldId="514"/>
@@ -334,16 +417,46 @@
             <ac:spMk id="8" creationId="{EFF2A714-4BFE-4265-87E4-34F8FECB8F6F}"/>
           </ac:spMkLst>
         </pc:spChg>
+        <pc:spChg chg="mod">
+          <ac:chgData name="张 智" userId="36bdf691fd3510be" providerId="LiveId" clId="{EE2847C8-F971-4969-B5C0-FC1DB060E07D}" dt="2024-03-18T02:06:01.823" v="7664" actId="20577"/>
+          <ac:spMkLst>
+            <pc:docMk/>
+            <pc:sldMk cId="3263746602" sldId="514"/>
+            <ac:spMk id="10" creationId="{8869FF1C-52E8-43E9-AF5B-40AA94C39D62}"/>
+          </ac:spMkLst>
+        </pc:spChg>
       </pc:sldChg>
       <pc:sldChg chg="modNotesTx">
-        <pc:chgData name="张 智" userId="36bdf691fd3510be" providerId="LiveId" clId="{EE2847C8-F971-4969-B5C0-FC1DB060E07D}" dt="2024-03-17T13:24:37.036" v="4686" actId="20577"/>
+        <pc:chgData name="张 智" userId="36bdf691fd3510be" providerId="LiveId" clId="{EE2847C8-F971-4969-B5C0-FC1DB060E07D}" dt="2024-03-18T04:24:10.743" v="8555" actId="20577"/>
+        <pc:sldMkLst>
+          <pc:docMk/>
+          <pc:sldMk cId="2758315679" sldId="515"/>
+        </pc:sldMkLst>
+      </pc:sldChg>
+      <pc:sldChg chg="modNotesTx">
+        <pc:chgData name="张 智" userId="36bdf691fd3510be" providerId="LiveId" clId="{EE2847C8-F971-4969-B5C0-FC1DB060E07D}" dt="2024-03-18T02:52:15.238" v="8550" actId="20577"/>
         <pc:sldMkLst>
           <pc:docMk/>
           <pc:sldMk cId="2761264589" sldId="516"/>
         </pc:sldMkLst>
       </pc:sldChg>
+      <pc:sldChg chg="modSp mod">
+        <pc:chgData name="张 智" userId="36bdf691fd3510be" providerId="LiveId" clId="{EE2847C8-F971-4969-B5C0-FC1DB060E07D}" dt="2024-03-18T04:45:33.607" v="8593" actId="20577"/>
+        <pc:sldMkLst>
+          <pc:docMk/>
+          <pc:sldMk cId="3121942135" sldId="518"/>
+        </pc:sldMkLst>
+        <pc:spChg chg="mod">
+          <ac:chgData name="张 智" userId="36bdf691fd3510be" providerId="LiveId" clId="{EE2847C8-F971-4969-B5C0-FC1DB060E07D}" dt="2024-03-18T04:45:33.607" v="8593" actId="20577"/>
+          <ac:spMkLst>
+            <pc:docMk/>
+            <pc:sldMk cId="3121942135" sldId="518"/>
+            <ac:spMk id="3" creationId="{A063E825-B27E-43D0-A784-C43512E937CF}"/>
+          </ac:spMkLst>
+        </pc:spChg>
+      </pc:sldChg>
       <pc:sldChg chg="modSp mod modNotesTx">
-        <pc:chgData name="张 智" userId="36bdf691fd3510be" providerId="LiveId" clId="{EE2847C8-F971-4969-B5C0-FC1DB060E07D}" dt="2024-03-17T13:37:21.951" v="4970" actId="20577"/>
+        <pc:chgData name="张 智" userId="36bdf691fd3510be" providerId="LiveId" clId="{EE2847C8-F971-4969-B5C0-FC1DB060E07D}" dt="2024-03-18T04:42:16.431" v="8577" actId="20577"/>
         <pc:sldMkLst>
           <pc:docMk/>
           <pc:sldMk cId="2862420244" sldId="519"/>
@@ -365,8 +478,36 @@
           </ac:spMkLst>
         </pc:spChg>
       </pc:sldChg>
+      <pc:sldChg chg="modNotesTx">
+        <pc:chgData name="张 智" userId="36bdf691fd3510be" providerId="LiveId" clId="{EE2847C8-F971-4969-B5C0-FC1DB060E07D}" dt="2024-03-17T14:29:34.162" v="5662" actId="20577"/>
+        <pc:sldMkLst>
+          <pc:docMk/>
+          <pc:sldMk cId="2990205520" sldId="520"/>
+        </pc:sldMkLst>
+      </pc:sldChg>
+      <pc:sldChg chg="modNotesTx">
+        <pc:chgData name="张 智" userId="36bdf691fd3510be" providerId="LiveId" clId="{EE2847C8-F971-4969-B5C0-FC1DB060E07D}" dt="2024-03-17T14:33:22.027" v="5772" actId="20577"/>
+        <pc:sldMkLst>
+          <pc:docMk/>
+          <pc:sldMk cId="1733563212" sldId="521"/>
+        </pc:sldMkLst>
+      </pc:sldChg>
+      <pc:sldChg chg="modNotesTx">
+        <pc:chgData name="张 智" userId="36bdf691fd3510be" providerId="LiveId" clId="{EE2847C8-F971-4969-B5C0-FC1DB060E07D}" dt="2024-03-17T14:32:23.661" v="5760" actId="20577"/>
+        <pc:sldMkLst>
+          <pc:docMk/>
+          <pc:sldMk cId="3333459246" sldId="523"/>
+        </pc:sldMkLst>
+      </pc:sldChg>
+      <pc:sldChg chg="modNotesTx">
+        <pc:chgData name="张 智" userId="36bdf691fd3510be" providerId="LiveId" clId="{EE2847C8-F971-4969-B5C0-FC1DB060E07D}" dt="2024-03-17T14:35:33.035" v="5773" actId="20577"/>
+        <pc:sldMkLst>
+          <pc:docMk/>
+          <pc:sldMk cId="3085203614" sldId="525"/>
+        </pc:sldMkLst>
+      </pc:sldChg>
       <pc:sldChg chg="modSp mod modNotesTx">
-        <pc:chgData name="张 智" userId="36bdf691fd3510be" providerId="LiveId" clId="{EE2847C8-F971-4969-B5C0-FC1DB060E07D}" dt="2024-03-14T05:52:42.335" v="840" actId="20577"/>
+        <pc:chgData name="张 智" userId="36bdf691fd3510be" providerId="LiveId" clId="{EE2847C8-F971-4969-B5C0-FC1DB060E07D}" dt="2024-03-17T14:42:11.150" v="5947" actId="20577"/>
         <pc:sldMkLst>
           <pc:docMk/>
           <pc:sldMk cId="4055979932" sldId="527"/>
@@ -389,7 +530,7 @@
         </pc:cxnChg>
       </pc:sldChg>
       <pc:sldChg chg="delSp modSp mod modNotesTx">
-        <pc:chgData name="张 智" userId="36bdf691fd3510be" providerId="LiveId" clId="{EE2847C8-F971-4969-B5C0-FC1DB060E07D}" dt="2024-03-15T02:01:59.643" v="855" actId="20577"/>
+        <pc:chgData name="张 智" userId="36bdf691fd3510be" providerId="LiveId" clId="{EE2847C8-F971-4969-B5C0-FC1DB060E07D}" dt="2024-03-17T14:49:42.493" v="6240" actId="20577"/>
         <pc:sldMkLst>
           <pc:docMk/>
           <pc:sldMk cId="1195795184" sldId="528"/>
@@ -420,7 +561,7 @@
         </pc:cxnChg>
       </pc:sldChg>
       <pc:sldChg chg="addSp delSp modSp mod modNotesTx">
-        <pc:chgData name="张 智" userId="36bdf691fd3510be" providerId="LiveId" clId="{EE2847C8-F971-4969-B5C0-FC1DB060E07D}" dt="2024-03-15T02:30:23.176" v="1210" actId="20577"/>
+        <pc:chgData name="张 智" userId="36bdf691fd3510be" providerId="LiveId" clId="{EE2847C8-F971-4969-B5C0-FC1DB060E07D}" dt="2024-03-18T00:55:18.291" v="6513" actId="20577"/>
         <pc:sldMkLst>
           <pc:docMk/>
           <pc:sldMk cId="3570713223" sldId="536"/>
@@ -482,21 +623,28 @@
         </pc:sldMkLst>
       </pc:sldChg>
       <pc:sldChg chg="modNotesTx">
-        <pc:chgData name="张 智" userId="36bdf691fd3510be" providerId="LiveId" clId="{EE2847C8-F971-4969-B5C0-FC1DB060E07D}" dt="2024-03-16T14:07:41.598" v="2472" actId="20577"/>
+        <pc:chgData name="张 智" userId="36bdf691fd3510be" providerId="LiveId" clId="{EE2847C8-F971-4969-B5C0-FC1DB060E07D}" dt="2024-03-18T01:24:54.399" v="7078" actId="20577"/>
         <pc:sldMkLst>
           <pc:docMk/>
           <pc:sldMk cId="2533689939" sldId="538"/>
         </pc:sldMkLst>
       </pc:sldChg>
       <pc:sldChg chg="modNotesTx">
-        <pc:chgData name="张 智" userId="36bdf691fd3510be" providerId="LiveId" clId="{EE2847C8-F971-4969-B5C0-FC1DB060E07D}" dt="2024-03-16T14:09:02.634" v="2484" actId="20577"/>
+        <pc:chgData name="张 智" userId="36bdf691fd3510be" providerId="LiveId" clId="{EE2847C8-F971-4969-B5C0-FC1DB060E07D}" dt="2024-03-18T01:28:26.595" v="7082" actId="20577"/>
         <pc:sldMkLst>
           <pc:docMk/>
           <pc:sldMk cId="1771193055" sldId="539"/>
         </pc:sldMkLst>
       </pc:sldChg>
+      <pc:sldChg chg="modNotesTx">
+        <pc:chgData name="张 智" userId="36bdf691fd3510be" providerId="LiveId" clId="{EE2847C8-F971-4969-B5C0-FC1DB060E07D}" dt="2024-03-17T14:53:53.009" v="6267" actId="20577"/>
+        <pc:sldMkLst>
+          <pc:docMk/>
+          <pc:sldMk cId="377284399" sldId="541"/>
+        </pc:sldMkLst>
+      </pc:sldChg>
       <pc:sldChg chg="modSp mod modNotesTx">
-        <pc:chgData name="张 智" userId="36bdf691fd3510be" providerId="LiveId" clId="{EE2847C8-F971-4969-B5C0-FC1DB060E07D}" dt="2024-03-15T02:18:31.980" v="1051" actId="207"/>
+        <pc:chgData name="张 智" userId="36bdf691fd3510be" providerId="LiveId" clId="{EE2847C8-F971-4969-B5C0-FC1DB060E07D}" dt="2024-03-18T00:28:18.242" v="6506" actId="20577"/>
         <pc:sldMkLst>
           <pc:docMk/>
           <pc:sldMk cId="29640058" sldId="542"/>
@@ -518,14 +666,21 @@
         </pc:sldMkLst>
       </pc:sldChg>
       <pc:sldChg chg="modNotesTx">
-        <pc:chgData name="张 智" userId="36bdf691fd3510be" providerId="LiveId" clId="{EE2847C8-F971-4969-B5C0-FC1DB060E07D}" dt="2024-03-14T05:47:17.495" v="375" actId="20577"/>
+        <pc:chgData name="张 智" userId="36bdf691fd3510be" providerId="LiveId" clId="{EE2847C8-F971-4969-B5C0-FC1DB060E07D}" dt="2024-03-17T14:40:14.820" v="5919" actId="20577"/>
         <pc:sldMkLst>
           <pc:docMk/>
           <pc:sldMk cId="1907492785" sldId="548"/>
         </pc:sldMkLst>
       </pc:sldChg>
       <pc:sldChg chg="modNotesTx">
-        <pc:chgData name="张 智" userId="36bdf691fd3510be" providerId="LiveId" clId="{EE2847C8-F971-4969-B5C0-FC1DB060E07D}" dt="2024-03-14T05:55:08.269" v="844" actId="20577"/>
+        <pc:chgData name="张 智" userId="36bdf691fd3510be" providerId="LiveId" clId="{EE2847C8-F971-4969-B5C0-FC1DB060E07D}" dt="2024-03-17T14:36:42.672" v="5782" actId="20577"/>
+        <pc:sldMkLst>
+          <pc:docMk/>
+          <pc:sldMk cId="4051090900" sldId="549"/>
+        </pc:sldMkLst>
+      </pc:sldChg>
+      <pc:sldChg chg="modNotesTx">
+        <pc:chgData name="张 智" userId="36bdf691fd3510be" providerId="LiveId" clId="{EE2847C8-F971-4969-B5C0-FC1DB060E07D}" dt="2024-03-17T14:46:16.433" v="6202" actId="20577"/>
         <pc:sldMkLst>
           <pc:docMk/>
           <pc:sldMk cId="3209702904" sldId="550"/>
@@ -539,7 +694,7 @@
         </pc:sldMkLst>
       </pc:sldChg>
       <pc:sldChg chg="modSp mod modNotesTx">
-        <pc:chgData name="张 智" userId="36bdf691fd3510be" providerId="LiveId" clId="{EE2847C8-F971-4969-B5C0-FC1DB060E07D}" dt="2024-03-17T11:46:39.709" v="3092" actId="20577"/>
+        <pc:chgData name="张 智" userId="36bdf691fd3510be" providerId="LiveId" clId="{EE2847C8-F971-4969-B5C0-FC1DB060E07D}" dt="2024-03-17T14:25:22.091" v="5656" actId="20577"/>
         <pc:sldMkLst>
           <pc:docMk/>
           <pc:sldMk cId="1945545737" sldId="552"/>
@@ -554,7 +709,7 @@
         </pc:spChg>
       </pc:sldChg>
       <pc:sldChg chg="addSp delSp modSp mod modNotesTx">
-        <pc:chgData name="张 智" userId="36bdf691fd3510be" providerId="LiveId" clId="{EE2847C8-F971-4969-B5C0-FC1DB060E07D}" dt="2024-03-17T13:18:02.311" v="4235" actId="20577"/>
+        <pc:chgData name="张 智" userId="36bdf691fd3510be" providerId="LiveId" clId="{EE2847C8-F971-4969-B5C0-FC1DB060E07D}" dt="2024-03-18T02:27:26.996" v="8321" actId="20577"/>
         <pc:sldMkLst>
           <pc:docMk/>
           <pc:sldMk cId="3399154406" sldId="553"/>
@@ -608,14 +763,21 @@
           </ac:picMkLst>
         </pc:picChg>
       </pc:sldChg>
+      <pc:sldChg chg="modNotesTx">
+        <pc:chgData name="张 智" userId="36bdf691fd3510be" providerId="LiveId" clId="{EE2847C8-F971-4969-B5C0-FC1DB060E07D}" dt="2024-03-18T04:45:52.926" v="8598" actId="20577"/>
+        <pc:sldMkLst>
+          <pc:docMk/>
+          <pc:sldMk cId="853962288" sldId="554"/>
+        </pc:sldMkLst>
+      </pc:sldChg>
       <pc:sldChg chg="modSp mod modNotesTx">
-        <pc:chgData name="张 智" userId="36bdf691fd3510be" providerId="LiveId" clId="{EE2847C8-F971-4969-B5C0-FC1DB060E07D}" dt="2024-03-17T13:43:39.807" v="5266" actId="20577"/>
+        <pc:chgData name="张 智" userId="36bdf691fd3510be" providerId="LiveId" clId="{EE2847C8-F971-4969-B5C0-FC1DB060E07D}" dt="2024-03-18T04:58:27.923" v="8699" actId="20577"/>
         <pc:sldMkLst>
           <pc:docMk/>
           <pc:sldMk cId="1050398790" sldId="555"/>
         </pc:sldMkLst>
         <pc:spChg chg="mod">
-          <ac:chgData name="张 智" userId="36bdf691fd3510be" providerId="LiveId" clId="{EE2847C8-F971-4969-B5C0-FC1DB060E07D}" dt="2024-03-17T13:43:26.530" v="5264" actId="20577"/>
+          <ac:chgData name="张 智" userId="36bdf691fd3510be" providerId="LiveId" clId="{EE2847C8-F971-4969-B5C0-FC1DB060E07D}" dt="2024-03-18T04:58:27.923" v="8699" actId="20577"/>
           <ac:spMkLst>
             <pc:docMk/>
             <pc:sldMk cId="1050398790" sldId="555"/>
@@ -624,7 +786,7 @@
         </pc:spChg>
       </pc:sldChg>
       <pc:sldChg chg="addSp modSp mod modNotesTx">
-        <pc:chgData name="张 智" userId="36bdf691fd3510be" providerId="LiveId" clId="{EE2847C8-F971-4969-B5C0-FC1DB060E07D}" dt="2024-03-15T02:14:04.147" v="940" actId="20577"/>
+        <pc:chgData name="张 智" userId="36bdf691fd3510be" providerId="LiveId" clId="{EE2847C8-F971-4969-B5C0-FC1DB060E07D}" dt="2024-03-18T00:23:40.816" v="6391" actId="20577"/>
         <pc:sldMkLst>
           <pc:docMk/>
           <pc:sldMk cId="2605665036" sldId="556"/>
@@ -638,7 +800,7 @@
           </ac:spMkLst>
         </pc:spChg>
         <pc:spChg chg="mod">
-          <ac:chgData name="张 智" userId="36bdf691fd3510be" providerId="LiveId" clId="{EE2847C8-F971-4969-B5C0-FC1DB060E07D}" dt="2024-03-15T02:11:37.821" v="916" actId="20577"/>
+          <ac:chgData name="张 智" userId="36bdf691fd3510be" providerId="LiveId" clId="{EE2847C8-F971-4969-B5C0-FC1DB060E07D}" dt="2024-03-17T14:54:46.534" v="6268" actId="207"/>
           <ac:spMkLst>
             <pc:docMk/>
             <pc:sldMk cId="2605665036" sldId="556"/>
@@ -695,27 +857,27 @@
         </pc:cxnChg>
       </pc:sldChg>
       <pc:sldChg chg="add modNotesTx">
-        <pc:chgData name="张 智" userId="36bdf691fd3510be" providerId="LiveId" clId="{EE2847C8-F971-4969-B5C0-FC1DB060E07D}" dt="2024-03-15T02:01:48.443" v="850" actId="20577"/>
+        <pc:chgData name="张 智" userId="36bdf691fd3510be" providerId="LiveId" clId="{EE2847C8-F971-4969-B5C0-FC1DB060E07D}" dt="2024-03-17T14:51:13.732" v="6266" actId="20577"/>
         <pc:sldMkLst>
           <pc:docMk/>
           <pc:sldMk cId="1104233246" sldId="557"/>
         </pc:sldMkLst>
       </pc:sldChg>
       <pc:sldChg chg="add modNotesTx">
-        <pc:chgData name="张 智" userId="36bdf691fd3510be" providerId="LiveId" clId="{EE2847C8-F971-4969-B5C0-FC1DB060E07D}" dt="2024-03-16T14:03:55.665" v="2411" actId="20577"/>
+        <pc:chgData name="张 智" userId="36bdf691fd3510be" providerId="LiveId" clId="{EE2847C8-F971-4969-B5C0-FC1DB060E07D}" dt="2024-03-18T01:16:46.696" v="7033" actId="20577"/>
         <pc:sldMkLst>
           <pc:docMk/>
           <pc:sldMk cId="1351931914" sldId="558"/>
         </pc:sldMkLst>
       </pc:sldChg>
       <pc:sldChg chg="addSp delSp modSp add mod modNotesTx">
-        <pc:chgData name="张 智" userId="36bdf691fd3510be" providerId="LiveId" clId="{EE2847C8-F971-4969-B5C0-FC1DB060E07D}" dt="2024-03-16T01:50:22.184" v="1362" actId="313"/>
+        <pc:chgData name="张 智" userId="36bdf691fd3510be" providerId="LiveId" clId="{EE2847C8-F971-4969-B5C0-FC1DB060E07D}" dt="2024-03-18T01:14:36.363" v="7028" actId="20577"/>
         <pc:sldMkLst>
           <pc:docMk/>
           <pc:sldMk cId="2153819708" sldId="559"/>
         </pc:sldMkLst>
         <pc:spChg chg="mod">
-          <ac:chgData name="张 智" userId="36bdf691fd3510be" providerId="LiveId" clId="{EE2847C8-F971-4969-B5C0-FC1DB060E07D}" dt="2024-03-15T02:38:28.473" v="1312" actId="207"/>
+          <ac:chgData name="张 智" userId="36bdf691fd3510be" providerId="LiveId" clId="{EE2847C8-F971-4969-B5C0-FC1DB060E07D}" dt="2024-03-18T00:58:36.657" v="6598" actId="20577"/>
           <ac:spMkLst>
             <pc:docMk/>
             <pc:sldMk cId="2153819708" sldId="559"/>
@@ -723,7 +885,7 @@
           </ac:spMkLst>
         </pc:spChg>
         <pc:spChg chg="add mod">
-          <ac:chgData name="张 智" userId="36bdf691fd3510be" providerId="LiveId" clId="{EE2847C8-F971-4969-B5C0-FC1DB060E07D}" dt="2024-03-16T01:49:38.877" v="1333" actId="20577"/>
+          <ac:chgData name="张 智" userId="36bdf691fd3510be" providerId="LiveId" clId="{EE2847C8-F971-4969-B5C0-FC1DB060E07D}" dt="2024-03-18T01:12:14.802" v="6849" actId="20577"/>
           <ac:spMkLst>
             <pc:docMk/>
             <pc:sldMk cId="2153819708" sldId="559"/>
@@ -755,8 +917,8 @@
           </ac:spMkLst>
         </pc:spChg>
       </pc:sldChg>
-      <pc:sldChg chg="modSp add mod modNotesTx">
-        <pc:chgData name="张 智" userId="36bdf691fd3510be" providerId="LiveId" clId="{EE2847C8-F971-4969-B5C0-FC1DB060E07D}" dt="2024-03-16T13:52:04.222" v="2325" actId="5793"/>
+      <pc:sldChg chg="modSp add del mod modNotesTx">
+        <pc:chgData name="张 智" userId="36bdf691fd3510be" providerId="LiveId" clId="{EE2847C8-F971-4969-B5C0-FC1DB060E07D}" dt="2024-03-18T01:16:30.025" v="7029" actId="2696"/>
         <pc:sldMkLst>
           <pc:docMk/>
           <pc:sldMk cId="3369681238" sldId="560"/>
@@ -787,7 +949,7 @@
         </pc:spChg>
       </pc:sldChg>
       <pc:sldChg chg="addSp delSp modSp add mod ord modNotesTx">
-        <pc:chgData name="张 智" userId="36bdf691fd3510be" providerId="LiveId" clId="{EE2847C8-F971-4969-B5C0-FC1DB060E07D}" dt="2024-03-17T11:51:45.046" v="3228" actId="20577"/>
+        <pc:chgData name="张 智" userId="36bdf691fd3510be" providerId="LiveId" clId="{EE2847C8-F971-4969-B5C0-FC1DB060E07D}" dt="2024-03-18T01:46:18.081" v="7412" actId="20577"/>
         <pc:sldMkLst>
           <pc:docMk/>
           <pc:sldMk cId="3621300664" sldId="1515"/>
@@ -864,7 +1026,7 @@
         </pc:sldMkLst>
       </pc:sldChg>
       <pc:sldChg chg="addSp modSp add mod modNotesTx">
-        <pc:chgData name="张 智" userId="36bdf691fd3510be" providerId="LiveId" clId="{EE2847C8-F971-4969-B5C0-FC1DB060E07D}" dt="2024-03-17T12:14:13.744" v="3485" actId="20577"/>
+        <pc:chgData name="张 智" userId="36bdf691fd3510be" providerId="LiveId" clId="{EE2847C8-F971-4969-B5C0-FC1DB060E07D}" dt="2024-03-18T02:08:27.194" v="7816" actId="20577"/>
         <pc:sldMkLst>
           <pc:docMk/>
           <pc:sldMk cId="1898311247" sldId="1517"/>
@@ -879,7 +1041,7 @@
         </pc:picChg>
       </pc:sldChg>
       <pc:sldChg chg="addSp delSp modSp add mod modNotesTx">
-        <pc:chgData name="张 智" userId="36bdf691fd3510be" providerId="LiveId" clId="{EE2847C8-F971-4969-B5C0-FC1DB060E07D}" dt="2024-03-17T13:20:12.282" v="4438" actId="20577"/>
+        <pc:chgData name="张 智" userId="36bdf691fd3510be" providerId="LiveId" clId="{EE2847C8-F971-4969-B5C0-FC1DB060E07D}" dt="2024-03-18T02:09:56.695" v="7822" actId="478"/>
         <pc:sldMkLst>
           <pc:docMk/>
           <pc:sldMk cId="645220214" sldId="1518"/>
@@ -940,8 +1102,8 @@
             <ac:picMk id="11" creationId="{4B9EB2E1-E35B-4F9C-A6CD-2D26BA1B794B}"/>
           </ac:picMkLst>
         </pc:picChg>
-        <pc:picChg chg="add mod">
-          <ac:chgData name="张 智" userId="36bdf691fd3510be" providerId="LiveId" clId="{EE2847C8-F971-4969-B5C0-FC1DB060E07D}" dt="2024-03-17T13:12:30.595" v="4077" actId="1076"/>
+        <pc:picChg chg="add del mod">
+          <ac:chgData name="张 智" userId="36bdf691fd3510be" providerId="LiveId" clId="{EE2847C8-F971-4969-B5C0-FC1DB060E07D}" dt="2024-03-18T02:09:55.612" v="7820" actId="478"/>
           <ac:picMkLst>
             <pc:docMk/>
             <pc:sldMk cId="645220214" sldId="1518"/>
@@ -980,16 +1142,16 @@
             <ac:picMk id="21" creationId="{1BCA2303-2DAF-4998-BB98-CC68048816D7}"/>
           </ac:picMkLst>
         </pc:picChg>
-        <pc:picChg chg="add mod">
-          <ac:chgData name="张 智" userId="36bdf691fd3510be" providerId="LiveId" clId="{EE2847C8-F971-4969-B5C0-FC1DB060E07D}" dt="2024-03-17T13:18:33.243" v="4237" actId="1076"/>
+        <pc:picChg chg="add del mod">
+          <ac:chgData name="张 智" userId="36bdf691fd3510be" providerId="LiveId" clId="{EE2847C8-F971-4969-B5C0-FC1DB060E07D}" dt="2024-03-18T02:09:56.695" v="7822" actId="478"/>
           <ac:picMkLst>
             <pc:docMk/>
             <pc:sldMk cId="645220214" sldId="1518"/>
             <ac:picMk id="23" creationId="{0F33F889-BE04-4164-A3E7-379D16C3A386}"/>
           </ac:picMkLst>
         </pc:picChg>
-        <pc:picChg chg="add mod">
-          <ac:chgData name="张 智" userId="36bdf691fd3510be" providerId="LiveId" clId="{EE2847C8-F971-4969-B5C0-FC1DB060E07D}" dt="2024-03-17T13:18:33.243" v="4237" actId="1076"/>
+        <pc:picChg chg="add del mod">
+          <ac:chgData name="张 智" userId="36bdf691fd3510be" providerId="LiveId" clId="{EE2847C8-F971-4969-B5C0-FC1DB060E07D}" dt="2024-03-18T02:09:56.239" v="7821" actId="478"/>
           <ac:picMkLst>
             <pc:docMk/>
             <pc:sldMk cId="645220214" sldId="1518"/>
@@ -1041,6 +1203,36 @@
             <ac:spMk id="12" creationId="{C35F5975-2C76-4F59-A37E-82C404CDCDDD}"/>
           </ac:spMkLst>
         </pc:spChg>
+      </pc:sldChg>
+      <pc:sldChg chg="delSp add mod modNotesTx">
+        <pc:chgData name="张 智" userId="36bdf691fd3510be" providerId="LiveId" clId="{EE2847C8-F971-4969-B5C0-FC1DB060E07D}" dt="2024-03-18T02:14:15.124" v="7915" actId="20577"/>
+        <pc:sldMkLst>
+          <pc:docMk/>
+          <pc:sldMk cId="106675896" sldId="1521"/>
+        </pc:sldMkLst>
+        <pc:picChg chg="del">
+          <ac:chgData name="张 智" userId="36bdf691fd3510be" providerId="LiveId" clId="{EE2847C8-F971-4969-B5C0-FC1DB060E07D}" dt="2024-03-18T02:12:11.447" v="7825" actId="478"/>
+          <ac:picMkLst>
+            <pc:docMk/>
+            <pc:sldMk cId="106675896" sldId="1521"/>
+            <ac:picMk id="23" creationId="{0F33F889-BE04-4164-A3E7-379D16C3A386}"/>
+          </ac:picMkLst>
+        </pc:picChg>
+        <pc:picChg chg="del">
+          <ac:chgData name="张 智" userId="36bdf691fd3510be" providerId="LiveId" clId="{EE2847C8-F971-4969-B5C0-FC1DB060E07D}" dt="2024-03-18T02:12:12.859" v="7826" actId="478"/>
+          <ac:picMkLst>
+            <pc:docMk/>
+            <pc:sldMk cId="106675896" sldId="1521"/>
+            <ac:picMk id="25" creationId="{0AD241A0-D20B-421B-BE89-502708AC0605}"/>
+          </ac:picMkLst>
+        </pc:picChg>
+      </pc:sldChg>
+      <pc:sldChg chg="add modNotesTx">
+        <pc:chgData name="张 智" userId="36bdf691fd3510be" providerId="LiveId" clId="{EE2847C8-F971-4969-B5C0-FC1DB060E07D}" dt="2024-03-18T02:21:48.483" v="8037" actId="20577"/>
+        <pc:sldMkLst>
+          <pc:docMk/>
+          <pc:sldMk cId="670833388" sldId="1522"/>
+        </pc:sldMkLst>
       </pc:sldChg>
     </pc:docChg>
   </pc:docChgLst>
@@ -2372,7 +2564,7 @@
           <a:p>
             <a:fld id="{6D6D7260-B7E4-B548-BD1F-84ED14536037}" type="datetimeFigureOut">
               <a:rPr lang="en-AU" smtClean="0"/>
-              <a:t>17/03/2024</a:t>
+              <a:t>18/03/2024</a:t>
             </a:fld>
             <a:endParaRPr lang="en-AU"/>
           </a:p>
@@ -6598,7 +6790,7 @@
     </p:spTree>
     <p:extLst>
       <p:ext uri="{BB962C8B-B14F-4D97-AF65-F5344CB8AC3E}">
-        <p14:creationId xmlns:p14="http://schemas.microsoft.com/office/powerpoint/2010/main" val="4137728388"/>
+        <p14:creationId xmlns:p14="http://schemas.microsoft.com/office/powerpoint/2010/main" val="1184146693"/>
       </p:ext>
     </p:extLst>
   </p:cSld>
@@ -6783,7 +6975,7 @@
     </p:spTree>
     <p:extLst>
       <p:ext uri="{BB962C8B-B14F-4D97-AF65-F5344CB8AC3E}">
-        <p14:creationId xmlns:p14="http://schemas.microsoft.com/office/powerpoint/2010/main" val="895153575"/>
+        <p14:creationId xmlns:p14="http://schemas.microsoft.com/office/powerpoint/2010/main" val="2856372758"/>
       </p:ext>
     </p:extLst>
   </p:cSld>
@@ -6837,6 +7029,23 @@
           <a:bodyPr/>
           <a:lstStyle/>
           <a:p>
+            <a:pPr marL="0" marR="0" lvl="0" indent="0" algn="l" defTabSz="914400" rtl="0" eaLnBrk="1" fontAlgn="auto" latinLnBrk="0" hangingPunct="1">
+              <a:lnSpc>
+                <a:spcPct val="100000"/>
+              </a:lnSpc>
+              <a:spcBef>
+                <a:spcPts val="0"/>
+              </a:spcBef>
+              <a:spcAft>
+                <a:spcPts val="0"/>
+              </a:spcAft>
+              <a:buClrTx/>
+              <a:buSzTx/>
+              <a:buFontTx/>
+              <a:buNone/>
+              <a:tabLst/>
+              <a:defRPr/>
+            </a:pPr>
             <a:endParaRPr lang="en-AU" dirty="0"/>
           </a:p>
         </p:txBody>
@@ -6867,7 +7076,7 @@
     </p:spTree>
     <p:extLst>
       <p:ext uri="{BB962C8B-B14F-4D97-AF65-F5344CB8AC3E}">
-        <p14:creationId xmlns:p14="http://schemas.microsoft.com/office/powerpoint/2010/main" val="813264593"/>
+        <p14:creationId xmlns:p14="http://schemas.microsoft.com/office/powerpoint/2010/main" val="4137728388"/>
       </p:ext>
     </p:extLst>
   </p:cSld>
@@ -6921,6 +7130,23 @@
           <a:bodyPr/>
           <a:lstStyle/>
           <a:p>
+            <a:pPr marL="0" marR="0" lvl="0" indent="0" algn="l" defTabSz="914400" rtl="0" eaLnBrk="1" fontAlgn="auto" latinLnBrk="0" hangingPunct="1">
+              <a:lnSpc>
+                <a:spcPct val="100000"/>
+              </a:lnSpc>
+              <a:spcBef>
+                <a:spcPts val="0"/>
+              </a:spcBef>
+              <a:spcAft>
+                <a:spcPts val="0"/>
+              </a:spcAft>
+              <a:buClrTx/>
+              <a:buSzTx/>
+              <a:buFontTx/>
+              <a:buNone/>
+              <a:tabLst/>
+              <a:defRPr/>
+            </a:pPr>
             <a:endParaRPr lang="en-AU" dirty="0"/>
           </a:p>
         </p:txBody>
@@ -6951,7 +7177,7 @@
     </p:spTree>
     <p:extLst>
       <p:ext uri="{BB962C8B-B14F-4D97-AF65-F5344CB8AC3E}">
-        <p14:creationId xmlns:p14="http://schemas.microsoft.com/office/powerpoint/2010/main" val="2114929769"/>
+        <p14:creationId xmlns:p14="http://schemas.microsoft.com/office/powerpoint/2010/main" val="895153575"/>
       </p:ext>
     </p:extLst>
   </p:cSld>
@@ -7005,23 +7231,6 @@
           <a:bodyPr/>
           <a:lstStyle/>
           <a:p>
-            <a:pPr marL="0" marR="0" lvl="0" indent="0" algn="l" defTabSz="914400" rtl="0" eaLnBrk="1" fontAlgn="auto" latinLnBrk="0" hangingPunct="1">
-              <a:lnSpc>
-                <a:spcPct val="100000"/>
-              </a:lnSpc>
-              <a:spcBef>
-                <a:spcPts val="0"/>
-              </a:spcBef>
-              <a:spcAft>
-                <a:spcPts val="0"/>
-              </a:spcAft>
-              <a:buClrTx/>
-              <a:buSzTx/>
-              <a:buFontTx/>
-              <a:buNone/>
-              <a:tabLst/>
-              <a:defRPr/>
-            </a:pPr>
             <a:endParaRPr lang="en-AU" dirty="0"/>
           </a:p>
         </p:txBody>
@@ -7052,7 +7261,7 @@
     </p:spTree>
     <p:extLst>
       <p:ext uri="{BB962C8B-B14F-4D97-AF65-F5344CB8AC3E}">
-        <p14:creationId xmlns:p14="http://schemas.microsoft.com/office/powerpoint/2010/main" val="1875223113"/>
+        <p14:creationId xmlns:p14="http://schemas.microsoft.com/office/powerpoint/2010/main" val="813264593"/>
       </p:ext>
     </p:extLst>
   </p:cSld>
@@ -7106,23 +7315,6 @@
           <a:bodyPr/>
           <a:lstStyle/>
           <a:p>
-            <a:pPr marL="0" marR="0" lvl="0" indent="0" algn="l" defTabSz="914400" rtl="0" eaLnBrk="1" fontAlgn="auto" latinLnBrk="0" hangingPunct="1">
-              <a:lnSpc>
-                <a:spcPct val="100000"/>
-              </a:lnSpc>
-              <a:spcBef>
-                <a:spcPts val="0"/>
-              </a:spcBef>
-              <a:spcAft>
-                <a:spcPts val="0"/>
-              </a:spcAft>
-              <a:buClrTx/>
-              <a:buSzTx/>
-              <a:buFontTx/>
-              <a:buNone/>
-              <a:tabLst/>
-              <a:defRPr/>
-            </a:pPr>
             <a:endParaRPr lang="en-AU" dirty="0"/>
           </a:p>
         </p:txBody>
@@ -7153,7 +7345,7 @@
     </p:spTree>
     <p:extLst>
       <p:ext uri="{BB962C8B-B14F-4D97-AF65-F5344CB8AC3E}">
-        <p14:creationId xmlns:p14="http://schemas.microsoft.com/office/powerpoint/2010/main" val="1219494435"/>
+        <p14:creationId xmlns:p14="http://schemas.microsoft.com/office/powerpoint/2010/main" val="2114929769"/>
       </p:ext>
     </p:extLst>
   </p:cSld>
@@ -7254,7 +7446,7 @@
     </p:spTree>
     <p:extLst>
       <p:ext uri="{BB962C8B-B14F-4D97-AF65-F5344CB8AC3E}">
-        <p14:creationId xmlns:p14="http://schemas.microsoft.com/office/powerpoint/2010/main" val="1546278315"/>
+        <p14:creationId xmlns:p14="http://schemas.microsoft.com/office/powerpoint/2010/main" val="1875223113"/>
       </p:ext>
     </p:extLst>
   </p:cSld>
@@ -7355,7 +7547,7 @@
     </p:spTree>
     <p:extLst>
       <p:ext uri="{BB962C8B-B14F-4D97-AF65-F5344CB8AC3E}">
-        <p14:creationId xmlns:p14="http://schemas.microsoft.com/office/powerpoint/2010/main" val="210879796"/>
+        <p14:creationId xmlns:p14="http://schemas.microsoft.com/office/powerpoint/2010/main" val="1219494435"/>
       </p:ext>
     </p:extLst>
   </p:cSld>
@@ -7409,6 +7601,23 @@
           <a:bodyPr/>
           <a:lstStyle/>
           <a:p>
+            <a:pPr marL="0" marR="0" lvl="0" indent="0" algn="l" defTabSz="914400" rtl="0" eaLnBrk="1" fontAlgn="auto" latinLnBrk="0" hangingPunct="1">
+              <a:lnSpc>
+                <a:spcPct val="100000"/>
+              </a:lnSpc>
+              <a:spcBef>
+                <a:spcPts val="0"/>
+              </a:spcBef>
+              <a:spcAft>
+                <a:spcPts val="0"/>
+              </a:spcAft>
+              <a:buClrTx/>
+              <a:buSzTx/>
+              <a:buFontTx/>
+              <a:buNone/>
+              <a:tabLst/>
+              <a:defRPr/>
+            </a:pPr>
             <a:endParaRPr lang="en-AU" dirty="0"/>
           </a:p>
         </p:txBody>
@@ -7439,7 +7648,7 @@
     </p:spTree>
     <p:extLst>
       <p:ext uri="{BB962C8B-B14F-4D97-AF65-F5344CB8AC3E}">
-        <p14:creationId xmlns:p14="http://schemas.microsoft.com/office/powerpoint/2010/main" val="2577830088"/>
+        <p14:creationId xmlns:p14="http://schemas.microsoft.com/office/powerpoint/2010/main" val="1546278315"/>
       </p:ext>
     </p:extLst>
   </p:cSld>
@@ -7540,7 +7749,7 @@
     </p:spTree>
     <p:extLst>
       <p:ext uri="{BB962C8B-B14F-4D97-AF65-F5344CB8AC3E}">
-        <p14:creationId xmlns:p14="http://schemas.microsoft.com/office/powerpoint/2010/main" val="3930088544"/>
+        <p14:creationId xmlns:p14="http://schemas.microsoft.com/office/powerpoint/2010/main" val="210879796"/>
       </p:ext>
     </p:extLst>
   </p:cSld>
@@ -7594,23 +7803,6 @@
           <a:bodyPr/>
           <a:lstStyle/>
           <a:p>
-            <a:pPr marL="0" marR="0" lvl="0" indent="0" algn="l" defTabSz="914400" rtl="0" eaLnBrk="1" fontAlgn="auto" latinLnBrk="0" hangingPunct="1">
-              <a:lnSpc>
-                <a:spcPct val="100000"/>
-              </a:lnSpc>
-              <a:spcBef>
-                <a:spcPts val="0"/>
-              </a:spcBef>
-              <a:spcAft>
-                <a:spcPts val="0"/>
-              </a:spcAft>
-              <a:buClrTx/>
-              <a:buSzTx/>
-              <a:buFontTx/>
-              <a:buNone/>
-              <a:tabLst/>
-              <a:defRPr/>
-            </a:pPr>
             <a:endParaRPr lang="en-AU" dirty="0"/>
           </a:p>
         </p:txBody>
@@ -7641,7 +7833,7 @@
     </p:spTree>
     <p:extLst>
       <p:ext uri="{BB962C8B-B14F-4D97-AF65-F5344CB8AC3E}">
-        <p14:creationId xmlns:p14="http://schemas.microsoft.com/office/powerpoint/2010/main" val="3413290938"/>
+        <p14:creationId xmlns:p14="http://schemas.microsoft.com/office/powerpoint/2010/main" val="2577830088"/>
       </p:ext>
     </p:extLst>
   </p:cSld>
@@ -7726,6 +7918,208 @@
     <p:extLst>
       <p:ext uri="{BB962C8B-B14F-4D97-AF65-F5344CB8AC3E}">
         <p14:creationId xmlns:p14="http://schemas.microsoft.com/office/powerpoint/2010/main" val="1202930411"/>
+      </p:ext>
+    </p:extLst>
+  </p:cSld>
+  <p:clrMapOvr>
+    <a:masterClrMapping/>
+  </p:clrMapOvr>
+</p:notes>
+</file>
+
+<file path=ppt/notesSlides/notesSlide60.xml><?xml version="1.0" encoding="utf-8"?>
+<p:notes xmlns:a="http://schemas.openxmlformats.org/drawingml/2006/main" xmlns:r="http://schemas.openxmlformats.org/officeDocument/2006/relationships" xmlns:p="http://schemas.openxmlformats.org/presentationml/2006/main">
+  <p:cSld>
+    <p:spTree>
+      <p:nvGrpSpPr>
+        <p:cNvPr id="1" name=""/>
+        <p:cNvGrpSpPr/>
+        <p:nvPr/>
+      </p:nvGrpSpPr>
+      <p:grpSpPr>
+        <a:xfrm>
+          <a:off x="0" y="0"/>
+          <a:ext cx="0" cy="0"/>
+          <a:chOff x="0" y="0"/>
+          <a:chExt cx="0" cy="0"/>
+        </a:xfrm>
+      </p:grpSpPr>
+      <p:sp>
+        <p:nvSpPr>
+          <p:cNvPr id="2" name="Slide Image Placeholder 1"/>
+          <p:cNvSpPr>
+            <a:spLocks noGrp="1" noRot="1" noChangeAspect="1"/>
+          </p:cNvSpPr>
+          <p:nvPr>
+            <p:ph type="sldImg"/>
+          </p:nvPr>
+        </p:nvSpPr>
+        <p:spPr/>
+      </p:sp>
+      <p:sp>
+        <p:nvSpPr>
+          <p:cNvPr id="3" name="Notes Placeholder 2"/>
+          <p:cNvSpPr>
+            <a:spLocks noGrp="1"/>
+          </p:cNvSpPr>
+          <p:nvPr>
+            <p:ph type="body" idx="1"/>
+          </p:nvPr>
+        </p:nvSpPr>
+        <p:spPr/>
+        <p:txBody>
+          <a:bodyPr/>
+          <a:lstStyle/>
+          <a:p>
+            <a:pPr marL="0" marR="0" lvl="0" indent="0" algn="l" defTabSz="914400" rtl="0" eaLnBrk="1" fontAlgn="auto" latinLnBrk="0" hangingPunct="1">
+              <a:lnSpc>
+                <a:spcPct val="100000"/>
+              </a:lnSpc>
+              <a:spcBef>
+                <a:spcPts val="0"/>
+              </a:spcBef>
+              <a:spcAft>
+                <a:spcPts val="0"/>
+              </a:spcAft>
+              <a:buClrTx/>
+              <a:buSzTx/>
+              <a:buFontTx/>
+              <a:buNone/>
+              <a:tabLst/>
+              <a:defRPr/>
+            </a:pPr>
+            <a:endParaRPr lang="en-AU" dirty="0"/>
+          </a:p>
+        </p:txBody>
+      </p:sp>
+      <p:sp>
+        <p:nvSpPr>
+          <p:cNvPr id="4" name="Slide Number Placeholder 3"/>
+          <p:cNvSpPr>
+            <a:spLocks noGrp="1"/>
+          </p:cNvSpPr>
+          <p:nvPr>
+            <p:ph type="sldNum" sz="quarter" idx="5"/>
+          </p:nvPr>
+        </p:nvSpPr>
+        <p:spPr/>
+        <p:txBody>
+          <a:bodyPr/>
+          <a:lstStyle/>
+          <a:p>
+            <a:fld id="{DF030C05-EF6C-9847-8923-580D76870F8E}" type="slidenum">
+              <a:rPr lang="en-AU" smtClean="0"/>
+              <a:t>60</a:t>
+            </a:fld>
+            <a:endParaRPr lang="en-AU"/>
+          </a:p>
+        </p:txBody>
+      </p:sp>
+    </p:spTree>
+    <p:extLst>
+      <p:ext uri="{BB962C8B-B14F-4D97-AF65-F5344CB8AC3E}">
+        <p14:creationId xmlns:p14="http://schemas.microsoft.com/office/powerpoint/2010/main" val="3930088544"/>
+      </p:ext>
+    </p:extLst>
+  </p:cSld>
+  <p:clrMapOvr>
+    <a:masterClrMapping/>
+  </p:clrMapOvr>
+</p:notes>
+</file>
+
+<file path=ppt/notesSlides/notesSlide61.xml><?xml version="1.0" encoding="utf-8"?>
+<p:notes xmlns:a="http://schemas.openxmlformats.org/drawingml/2006/main" xmlns:r="http://schemas.openxmlformats.org/officeDocument/2006/relationships" xmlns:p="http://schemas.openxmlformats.org/presentationml/2006/main">
+  <p:cSld>
+    <p:spTree>
+      <p:nvGrpSpPr>
+        <p:cNvPr id="1" name=""/>
+        <p:cNvGrpSpPr/>
+        <p:nvPr/>
+      </p:nvGrpSpPr>
+      <p:grpSpPr>
+        <a:xfrm>
+          <a:off x="0" y="0"/>
+          <a:ext cx="0" cy="0"/>
+          <a:chOff x="0" y="0"/>
+          <a:chExt cx="0" cy="0"/>
+        </a:xfrm>
+      </p:grpSpPr>
+      <p:sp>
+        <p:nvSpPr>
+          <p:cNvPr id="2" name="Slide Image Placeholder 1"/>
+          <p:cNvSpPr>
+            <a:spLocks noGrp="1" noRot="1" noChangeAspect="1"/>
+          </p:cNvSpPr>
+          <p:nvPr>
+            <p:ph type="sldImg"/>
+          </p:nvPr>
+        </p:nvSpPr>
+        <p:spPr/>
+      </p:sp>
+      <p:sp>
+        <p:nvSpPr>
+          <p:cNvPr id="3" name="Notes Placeholder 2"/>
+          <p:cNvSpPr>
+            <a:spLocks noGrp="1"/>
+          </p:cNvSpPr>
+          <p:nvPr>
+            <p:ph type="body" idx="1"/>
+          </p:nvPr>
+        </p:nvSpPr>
+        <p:spPr/>
+        <p:txBody>
+          <a:bodyPr/>
+          <a:lstStyle/>
+          <a:p>
+            <a:pPr marL="0" marR="0" lvl="0" indent="0" algn="l" defTabSz="914400" rtl="0" eaLnBrk="1" fontAlgn="auto" latinLnBrk="0" hangingPunct="1">
+              <a:lnSpc>
+                <a:spcPct val="100000"/>
+              </a:lnSpc>
+              <a:spcBef>
+                <a:spcPts val="0"/>
+              </a:spcBef>
+              <a:spcAft>
+                <a:spcPts val="0"/>
+              </a:spcAft>
+              <a:buClrTx/>
+              <a:buSzTx/>
+              <a:buFontTx/>
+              <a:buNone/>
+              <a:tabLst/>
+              <a:defRPr/>
+            </a:pPr>
+            <a:endParaRPr lang="en-AU" dirty="0"/>
+          </a:p>
+        </p:txBody>
+      </p:sp>
+      <p:sp>
+        <p:nvSpPr>
+          <p:cNvPr id="4" name="Slide Number Placeholder 3"/>
+          <p:cNvSpPr>
+            <a:spLocks noGrp="1"/>
+          </p:cNvSpPr>
+          <p:nvPr>
+            <p:ph type="sldNum" sz="quarter" idx="5"/>
+          </p:nvPr>
+        </p:nvSpPr>
+        <p:spPr/>
+        <p:txBody>
+          <a:bodyPr/>
+          <a:lstStyle/>
+          <a:p>
+            <a:fld id="{DF030C05-EF6C-9847-8923-580D76870F8E}" type="slidenum">
+              <a:rPr lang="en-AU" smtClean="0"/>
+              <a:t>61</a:t>
+            </a:fld>
+            <a:endParaRPr lang="en-AU"/>
+          </a:p>
+        </p:txBody>
+      </p:sp>
+    </p:spTree>
+    <p:extLst>
+      <p:ext uri="{BB962C8B-B14F-4D97-AF65-F5344CB8AC3E}">
+        <p14:creationId xmlns:p14="http://schemas.microsoft.com/office/powerpoint/2010/main" val="3413290938"/>
       </p:ext>
     </p:extLst>
   </p:cSld>
@@ -8172,7 +8566,7 @@
           <a:p>
             <a:fld id="{88D38747-4367-4BD2-8D51-C97E202738E2}" type="datetime1">
               <a:rPr lang="en-US" smtClean="0"/>
-              <a:t>3/17/2024</a:t>
+              <a:t>3/18/2024</a:t>
             </a:fld>
             <a:endParaRPr lang="en-US" dirty="0"/>
           </a:p>
@@ -8477,7 +8871,7 @@
           <a:p>
             <a:fld id="{11F1B079-7EF0-44EE-B798-BCC497C9F3B2}" type="datetime1">
               <a:rPr lang="en-US" smtClean="0"/>
-              <a:t>3/17/2024</a:t>
+              <a:t>3/18/2024</a:t>
             </a:fld>
             <a:endParaRPr lang="en-US" dirty="0"/>
           </a:p>
@@ -8671,7 +9065,7 @@
           <a:p>
             <a:fld id="{28FF70A8-1D13-4657-95F0-A9EA54967B8D}" type="datetime1">
               <a:rPr lang="en-US" smtClean="0"/>
-              <a:t>3/17/2024</a:t>
+              <a:t>3/18/2024</a:t>
             </a:fld>
             <a:endParaRPr lang="en-US" dirty="0"/>
           </a:p>
@@ -8934,7 +9328,7 @@
           <a:p>
             <a:fld id="{21EB90AC-71BD-4C7F-8ACA-7B3F18292E63}" type="datetime1">
               <a:rPr lang="en-US" smtClean="0"/>
-              <a:t>3/17/2024</a:t>
+              <a:t>3/18/2024</a:t>
             </a:fld>
             <a:endParaRPr lang="en-US" dirty="0"/>
           </a:p>
@@ -9370,7 +9764,7 @@
           <a:p>
             <a:fld id="{4E6EFC2C-8905-46F0-B443-CE905B76BA01}" type="datetime1">
               <a:rPr lang="en-US" smtClean="0"/>
-              <a:t>3/17/2024</a:t>
+              <a:t>3/18/2024</a:t>
             </a:fld>
             <a:endParaRPr lang="en-US" dirty="0"/>
           </a:p>
@@ -9907,7 +10301,7 @@
           <a:p>
             <a:fld id="{D9079DC3-C9B5-499E-9140-0DC28B7074E2}" type="datetime1">
               <a:rPr lang="en-US" smtClean="0"/>
-              <a:t>3/17/2024</a:t>
+              <a:t>3/18/2024</a:t>
             </a:fld>
             <a:endParaRPr lang="en-US" dirty="0"/>
           </a:p>
@@ -10789,7 +11183,7 @@
           <a:p>
             <a:fld id="{30BB33EA-E472-4D22-9C03-A9C14AA21CED}" type="datetime1">
               <a:rPr lang="en-US" smtClean="0"/>
-              <a:t>3/17/2024</a:t>
+              <a:t>3/18/2024</a:t>
             </a:fld>
             <a:endParaRPr lang="en-US" dirty="0"/>
           </a:p>
@@ -10959,7 +11353,7 @@
           <a:p>
             <a:fld id="{217E833E-1B6D-415F-AD29-75AE8C43BD0D}" type="datetime1">
               <a:rPr lang="en-US" smtClean="0"/>
-              <a:t>3/17/2024</a:t>
+              <a:t>3/18/2024</a:t>
             </a:fld>
             <a:endParaRPr lang="en-US" dirty="0"/>
           </a:p>
@@ -11143,7 +11537,7 @@
           <a:p>
             <a:fld id="{8452596F-08A7-4B70-989A-F2B1CF31E66B}" type="datetime1">
               <a:rPr lang="en-US" smtClean="0"/>
-              <a:t>3/17/2024</a:t>
+              <a:t>3/18/2024</a:t>
             </a:fld>
             <a:endParaRPr lang="en-US" dirty="0"/>
           </a:p>
@@ -11313,7 +11707,7 @@
           <a:p>
             <a:fld id="{73C55A3C-5767-4844-A0A3-83778C2E5409}" type="datetime1">
               <a:rPr lang="en-US" smtClean="0"/>
-              <a:t>3/17/2024</a:t>
+              <a:t>3/18/2024</a:t>
             </a:fld>
             <a:endParaRPr lang="en-US" dirty="0"/>
           </a:p>
@@ -11557,7 +11951,7 @@
           <a:p>
             <a:fld id="{CAE507A8-A5CF-4D38-AB86-7EDDA87A85D4}" type="datetime1">
               <a:rPr lang="en-US" smtClean="0"/>
-              <a:t>3/17/2024</a:t>
+              <a:t>3/18/2024</a:t>
             </a:fld>
             <a:endParaRPr lang="en-US" dirty="0"/>
           </a:p>
@@ -11799,7 +12193,7 @@
           <a:p>
             <a:fld id="{BDFCD27C-8599-43EF-BA1D-14DDC1946E06}" type="datetime1">
               <a:rPr lang="en-US" smtClean="0"/>
-              <a:t>3/17/2024</a:t>
+              <a:t>3/18/2024</a:t>
             </a:fld>
             <a:endParaRPr lang="en-US" dirty="0"/>
           </a:p>
@@ -12280,7 +12674,7 @@
           <a:p>
             <a:fld id="{49343D99-809A-49C0-96E5-4250D0B498EE}" type="datetime1">
               <a:rPr lang="en-US" smtClean="0"/>
-              <a:t>3/17/2024</a:t>
+              <a:t>3/18/2024</a:t>
             </a:fld>
             <a:endParaRPr lang="en-US" dirty="0"/>
           </a:p>
@@ -12398,7 +12792,7 @@
           <a:p>
             <a:fld id="{A143DE9B-B678-4EFB-BB7D-A4370204A0B0}" type="datetime1">
               <a:rPr lang="en-US" smtClean="0"/>
-              <a:t>3/17/2024</a:t>
+              <a:t>3/18/2024</a:t>
             </a:fld>
             <a:endParaRPr lang="en-US" dirty="0"/>
           </a:p>
@@ -12493,7 +12887,7 @@
           <a:p>
             <a:fld id="{E68812DA-F765-4142-A6A3-A8ED7235E082}" type="datetime1">
               <a:rPr lang="en-US" smtClean="0"/>
-              <a:t>3/17/2024</a:t>
+              <a:t>3/18/2024</a:t>
             </a:fld>
             <a:endParaRPr lang="en-US" dirty="0"/>
           </a:p>
@@ -12748,7 +13142,7 @@
           <a:p>
             <a:fld id="{3E0277FD-7DE6-41D4-930D-AC99F5AFE54E}" type="datetime1">
               <a:rPr lang="en-US" smtClean="0"/>
-              <a:t>3/17/2024</a:t>
+              <a:t>3/18/2024</a:t>
             </a:fld>
             <a:endParaRPr lang="en-US" dirty="0"/>
           </a:p>
@@ -13055,7 +13449,7 @@
           <a:p>
             <a:fld id="{9EA15526-7079-4B7B-987C-1B5FAE11A0FF}" type="datetime1">
               <a:rPr lang="en-US" smtClean="0"/>
-              <a:t>3/17/2024</a:t>
+              <a:t>3/18/2024</a:t>
             </a:fld>
             <a:endParaRPr lang="en-US" dirty="0"/>
           </a:p>
@@ -13290,7 +13684,7 @@
           <a:p>
             <a:fld id="{073ED0CC-082F-4160-86E5-0D6041F12778}" type="datetime1">
               <a:rPr lang="en-US" smtClean="0"/>
-              <a:t>3/17/2024</a:t>
+              <a:t>3/18/2024</a:t>
             </a:fld>
             <a:endParaRPr lang="en-US" dirty="0"/>
           </a:p>
@@ -29678,7 +30072,15 @@
             <a:pPr lvl="1"/>
             <a:r>
               <a:rPr lang="en-AU" sz="2800" dirty="0"/>
-              <a:t>dynamic decryption: provide a sandbox environment to execute malware and identify the pattern of malicious code at runtime</a:t>
+              <a:t>dynamic decryption: provide a sandbox environment to execute malware and identify the pattern of malicious code </a:t>
+            </a:r>
+            <a:r>
+              <a:rPr lang="en-AU" sz="2800" dirty="0">
+                <a:solidFill>
+                  <a:srgbClr val="FF0000"/>
+                </a:solidFill>
+              </a:rPr>
+              <a:t>at runtime</a:t>
             </a:r>
           </a:p>
           <a:p>
@@ -31865,7 +32267,9 @@
           </a:xfrm>
         </p:spPr>
         <p:txBody>
-          <a:bodyPr/>
+          <a:bodyPr>
+            <a:normAutofit fontScale="92500"/>
+          </a:bodyPr>
           <a:lstStyle/>
           <a:p>
             <a:r>
@@ -31874,7 +32278,7 @@
                   <a:srgbClr val="FF0000"/>
                 </a:solidFill>
               </a:rPr>
-              <a:t>Flower (or garbage) instructions</a:t>
+              <a:t>Garbage (or flower) instruction</a:t>
             </a:r>
             <a:r>
               <a:rPr lang="en-AU" sz="2800" dirty="0"/>
@@ -31882,7 +32286,7 @@
             </a:r>
             <a:r>
               <a:rPr lang="en-US" sz="2800" dirty="0"/>
-              <a:t>insertion of unnecessary instructions within a program to obfuscate software analysis</a:t>
+              <a:t>insertion of unnecessary instructions within a malware to obfuscate software analysis but retain the main logic of the malware</a:t>
             </a:r>
             <a:r>
               <a:rPr lang="en-AU" sz="2800" dirty="0"/>
@@ -32462,7 +32866,7 @@
                 </a:solidFill>
                 <a:effectLst/>
               </a:rPr>
-              <a:t> move the contents of </a:t>
+              <a:t> move the value of </a:t>
             </a:r>
             <a:r>
               <a:rPr lang="en-US" sz="2800" b="0" i="0" dirty="0" err="1">
@@ -37447,7 +37851,7 @@
         <p:spPr>
           <a:xfrm>
             <a:off x="548035" y="1362710"/>
-            <a:ext cx="10353762" cy="3714749"/>
+            <a:ext cx="10724846" cy="3714749"/>
           </a:xfrm>
         </p:spPr>
         <p:txBody>
@@ -37477,7 +37881,23 @@
             <a:pPr lvl="1"/>
             <a:r>
               <a:rPr lang="en-AU" sz="2800" dirty="0"/>
-              <a:t>e.g., it submits a given file or URL to many anti-malware engines, which apply different techniques for scanning. The techniques can be pattern detection, dynamic analysis, etc.</a:t>
+              <a:t>e.g., it submits a given file or URL to many anti-malware engines, which apply different techniques for scanning. The techniques can be pattern detection, dynamic </a:t>
+            </a:r>
+            <a:r>
+              <a:rPr lang="en-US" sz="2800" dirty="0"/>
+              <a:t>decryption</a:t>
+            </a:r>
+            <a:r>
+              <a:rPr lang="en-AU" sz="2800" dirty="0"/>
+              <a:t>, </a:t>
+            </a:r>
+            <a:r>
+              <a:rPr lang="en-US" sz="2800" dirty="0"/>
+              <a:t>heuristic detection, </a:t>
+            </a:r>
+            <a:r>
+              <a:rPr lang="en-AU" sz="2800" dirty="0"/>
+              <a:t>etc.</a:t>
             </a:r>
           </a:p>
           <a:p>
@@ -37574,7 +37994,7 @@
         <p:spPr>
           <a:xfrm>
             <a:off x="548035" y="1362710"/>
-            <a:ext cx="10353762" cy="3714749"/>
+            <a:ext cx="10724846" cy="3714749"/>
           </a:xfrm>
         </p:spPr>
         <p:txBody>
@@ -37604,7 +38024,23 @@
             <a:pPr lvl="1"/>
             <a:r>
               <a:rPr lang="en-AU" sz="2800" dirty="0"/>
-              <a:t>e.g., it submits a given file or URL to many anti-malware engines, which apply different techniques for scanning. The techniques can be pattern detection, dynamic analysis, etc.</a:t>
+              <a:t>e.g., it submits a given file or URL to many anti-malware engines, which apply different techniques for scanning. The techniques can be pattern detection, dynamic </a:t>
+            </a:r>
+            <a:r>
+              <a:rPr lang="en-US" sz="2800" dirty="0"/>
+              <a:t>decryption</a:t>
+            </a:r>
+            <a:r>
+              <a:rPr lang="en-AU" sz="2800" dirty="0"/>
+              <a:t>, </a:t>
+            </a:r>
+            <a:r>
+              <a:rPr lang="en-US" sz="2800" dirty="0"/>
+              <a:t>heuristic detection, </a:t>
+            </a:r>
+            <a:r>
+              <a:rPr lang="en-AU" sz="2800" dirty="0"/>
+              <a:t>etc.</a:t>
             </a:r>
           </a:p>
           <a:p>
@@ -37724,7 +38160,7 @@
         <p:spPr>
           <a:xfrm>
             <a:off x="548035" y="1362710"/>
-            <a:ext cx="10353762" cy="3714749"/>
+            <a:ext cx="10724846" cy="3714749"/>
           </a:xfrm>
         </p:spPr>
         <p:txBody>
@@ -37754,7 +38190,23 @@
             <a:pPr lvl="1"/>
             <a:r>
               <a:rPr lang="en-AU" sz="2800" dirty="0"/>
-              <a:t>e.g., it submits a given file or URL to many anti-malware engines, which apply different techniques for scanning. The techniques can be pattern detection, dynamic analysis, etc.</a:t>
+              <a:t>e.g., it submits a given file or URL to many anti-malware engines, which apply different techniques for scanning. The techniques can be pattern detection, dynamic </a:t>
+            </a:r>
+            <a:r>
+              <a:rPr lang="en-US" sz="2800" dirty="0"/>
+              <a:t>decryption</a:t>
+            </a:r>
+            <a:r>
+              <a:rPr lang="en-AU" sz="2800" dirty="0"/>
+              <a:t>, </a:t>
+            </a:r>
+            <a:r>
+              <a:rPr lang="en-US" sz="2800" dirty="0"/>
+              <a:t>heuristic detection, </a:t>
+            </a:r>
+            <a:r>
+              <a:rPr lang="en-AU" sz="2800" dirty="0"/>
+              <a:t>etc.</a:t>
             </a:r>
           </a:p>
           <a:p>
@@ -38551,21 +39003,31 @@
               <a:rPr lang="en-AU" sz="2800" dirty="0">
                 <a:effectLst/>
               </a:rPr>
+              <a:t>Inside the container</a:t>
+            </a:r>
+          </a:p>
+          <a:p>
+            <a:pPr lvl="1"/>
+            <a:r>
+              <a:rPr lang="en-AU" sz="2600" dirty="0">
+                <a:effectLst/>
+              </a:rPr>
               <a:t>apt-get install </a:t>
             </a:r>
             <a:r>
-              <a:rPr lang="en-AU" sz="2800" dirty="0" err="1">
+              <a:rPr lang="en-AU" sz="2600" dirty="0" err="1">
                 <a:effectLst/>
               </a:rPr>
               <a:t>yara</a:t>
             </a:r>
-            <a:endParaRPr lang="en-AU" sz="2800" dirty="0">
+            <a:endParaRPr lang="en-AU" sz="2600" dirty="0">
               <a:effectLst/>
             </a:endParaRPr>
           </a:p>
           <a:p>
-            <a:r>
-              <a:rPr lang="en-AU" sz="2800" dirty="0">
+            <a:pPr lvl="1"/>
+            <a:r>
+              <a:rPr lang="en-AU" sz="2600" dirty="0">
                 <a:effectLst/>
               </a:rPr>
               <a:t>git clone https://github.com/Yara-Rules/rules.git</a:t>
@@ -39481,10 +39943,10 @@
       </p:pic>
       <p:pic>
         <p:nvPicPr>
-          <p:cNvPr id="13" name="Picture 12">
-            <a:extLst>
-              <a:ext uri="{FF2B5EF4-FFF2-40B4-BE49-F238E27FC236}">
-                <a16:creationId xmlns:a16="http://schemas.microsoft.com/office/drawing/2014/main" id="{BB1F94DE-FFC7-4F0B-9F1E-B5B9BAC0B8E9}"/>
+          <p:cNvPr id="17" name="Picture 16">
+            <a:extLst>
+              <a:ext uri="{FF2B5EF4-FFF2-40B4-BE49-F238E27FC236}">
+                <a16:creationId xmlns:a16="http://schemas.microsoft.com/office/drawing/2014/main" id="{1143E811-3954-41A3-9D0D-2207B792E3A2}"/>
               </a:ext>
             </a:extLst>
           </p:cNvPr>
@@ -39501,98 +39963,8 @@
         </p:blipFill>
         <p:spPr>
           <a:xfrm>
-            <a:off x="294980" y="2672327"/>
-            <a:ext cx="10240804" cy="371527"/>
-          </a:xfrm>
-          <a:prstGeom prst="rect">
-            <a:avLst/>
-          </a:prstGeom>
-        </p:spPr>
-      </p:pic>
-      <p:pic>
-        <p:nvPicPr>
-          <p:cNvPr id="17" name="Picture 16">
-            <a:extLst>
-              <a:ext uri="{FF2B5EF4-FFF2-40B4-BE49-F238E27FC236}">
-                <a16:creationId xmlns:a16="http://schemas.microsoft.com/office/drawing/2014/main" id="{1143E811-3954-41A3-9D0D-2207B792E3A2}"/>
-              </a:ext>
-            </a:extLst>
-          </p:cNvPr>
-          <p:cNvPicPr>
-            <a:picLocks noChangeAspect="1"/>
-          </p:cNvPicPr>
-          <p:nvPr/>
-        </p:nvPicPr>
-        <p:blipFill>
-          <a:blip r:embed="rId5"/>
-          <a:stretch>
-            <a:fillRect/>
-          </a:stretch>
-        </p:blipFill>
-        <p:spPr>
-          <a:xfrm>
             <a:off x="294980" y="2261769"/>
             <a:ext cx="11117116" cy="275176"/>
-          </a:xfrm>
-          <a:prstGeom prst="rect">
-            <a:avLst/>
-          </a:prstGeom>
-        </p:spPr>
-      </p:pic>
-      <p:pic>
-        <p:nvPicPr>
-          <p:cNvPr id="23" name="Picture 22">
-            <a:extLst>
-              <a:ext uri="{FF2B5EF4-FFF2-40B4-BE49-F238E27FC236}">
-                <a16:creationId xmlns:a16="http://schemas.microsoft.com/office/drawing/2014/main" id="{0F33F889-BE04-4164-A3E7-379D16C3A386}"/>
-              </a:ext>
-            </a:extLst>
-          </p:cNvPr>
-          <p:cNvPicPr>
-            <a:picLocks noChangeAspect="1"/>
-          </p:cNvPicPr>
-          <p:nvPr/>
-        </p:nvPicPr>
-        <p:blipFill>
-          <a:blip r:embed="rId6"/>
-          <a:stretch>
-            <a:fillRect/>
-          </a:stretch>
-        </p:blipFill>
-        <p:spPr>
-          <a:xfrm>
-            <a:off x="294980" y="3361320"/>
-            <a:ext cx="5591955" cy="552527"/>
-          </a:xfrm>
-          <a:prstGeom prst="rect">
-            <a:avLst/>
-          </a:prstGeom>
-        </p:spPr>
-      </p:pic>
-      <p:pic>
-        <p:nvPicPr>
-          <p:cNvPr id="25" name="Picture 24">
-            <a:extLst>
-              <a:ext uri="{FF2B5EF4-FFF2-40B4-BE49-F238E27FC236}">
-                <a16:creationId xmlns:a16="http://schemas.microsoft.com/office/drawing/2014/main" id="{0AD241A0-D20B-421B-BE89-502708AC0605}"/>
-              </a:ext>
-            </a:extLst>
-          </p:cNvPr>
-          <p:cNvPicPr>
-            <a:picLocks noChangeAspect="1"/>
-          </p:cNvPicPr>
-          <p:nvPr/>
-        </p:nvPicPr>
-        <p:blipFill>
-          <a:blip r:embed="rId7"/>
-          <a:stretch>
-            <a:fillRect/>
-          </a:stretch>
-        </p:blipFill>
-        <p:spPr>
-          <a:xfrm>
-            <a:off x="294980" y="4042739"/>
-            <a:ext cx="4667901" cy="581106"/>
           </a:xfrm>
           <a:prstGeom prst="rect">
             <a:avLst/>
@@ -39856,70 +40228,10 @@
           </a:prstGeom>
         </p:spPr>
       </p:pic>
-      <p:pic>
-        <p:nvPicPr>
-          <p:cNvPr id="19" name="Picture 18">
-            <a:extLst>
-              <a:ext uri="{FF2B5EF4-FFF2-40B4-BE49-F238E27FC236}">
-                <a16:creationId xmlns:a16="http://schemas.microsoft.com/office/drawing/2014/main" id="{3F4B1488-7010-4F58-A666-F2A73FC7E724}"/>
-              </a:ext>
-            </a:extLst>
-          </p:cNvPr>
-          <p:cNvPicPr>
-            <a:picLocks noChangeAspect="1"/>
-          </p:cNvPicPr>
-          <p:nvPr/>
-        </p:nvPicPr>
-        <p:blipFill>
-          <a:blip r:embed="rId6"/>
-          <a:stretch>
-            <a:fillRect/>
-          </a:stretch>
-        </p:blipFill>
-        <p:spPr>
-          <a:xfrm>
-            <a:off x="294980" y="3212891"/>
-            <a:ext cx="5122715" cy="308214"/>
-          </a:xfrm>
-          <a:prstGeom prst="rect">
-            <a:avLst/>
-          </a:prstGeom>
-        </p:spPr>
-      </p:pic>
-      <p:pic>
-        <p:nvPicPr>
-          <p:cNvPr id="21" name="Picture 20">
-            <a:extLst>
-              <a:ext uri="{FF2B5EF4-FFF2-40B4-BE49-F238E27FC236}">
-                <a16:creationId xmlns:a16="http://schemas.microsoft.com/office/drawing/2014/main" id="{1BCA2303-2DAF-4998-BB98-CC68048816D7}"/>
-              </a:ext>
-            </a:extLst>
-          </p:cNvPr>
-          <p:cNvPicPr>
-            <a:picLocks noChangeAspect="1"/>
-          </p:cNvPicPr>
-          <p:nvPr/>
-        </p:nvPicPr>
-        <p:blipFill>
-          <a:blip r:embed="rId7"/>
-          <a:stretch>
-            <a:fillRect/>
-          </a:stretch>
-        </p:blipFill>
-        <p:spPr>
-          <a:xfrm>
-            <a:off x="292667" y="3690142"/>
-            <a:ext cx="10794898" cy="2656158"/>
-          </a:xfrm>
-          <a:prstGeom prst="rect">
-            <a:avLst/>
-          </a:prstGeom>
-        </p:spPr>
-      </p:pic>
     </p:spTree>
     <p:extLst>
       <p:ext uri="{BB962C8B-B14F-4D97-AF65-F5344CB8AC3E}">
-        <p14:creationId xmlns:p14="http://schemas.microsoft.com/office/powerpoint/2010/main" val="3766602079"/>
+        <p14:creationId xmlns:p14="http://schemas.microsoft.com/office/powerpoint/2010/main" val="106675896"/>
       </p:ext>
     </p:extLst>
   </p:cSld>
@@ -40200,8 +40512,8 @@
         </p:nvSpPr>
         <p:spPr>
           <a:xfrm>
-            <a:off x="292667" y="986987"/>
-            <a:ext cx="1970473" cy="639549"/>
+            <a:off x="2313" y="641416"/>
+            <a:ext cx="3690801" cy="626513"/>
           </a:xfrm>
           <a:prstGeom prst="roundRect">
             <a:avLst/>
@@ -40249,7 +40561,7 @@
                   </a:outerShdw>
                 </a:effectLst>
               </a:rPr>
-              <a:t>demo</a:t>
+              <a:t>How to run the demo</a:t>
             </a:r>
           </a:p>
         </p:txBody>
@@ -40273,7 +40585,7 @@
         <p:spPr>
           <a:xfrm>
             <a:off x="919119" y="81280"/>
-            <a:ext cx="10353762" cy="1052094"/>
+            <a:ext cx="10353762" cy="745355"/>
           </a:xfrm>
         </p:spPr>
         <p:txBody>
@@ -40287,10 +40599,160 @@
           </a:p>
         </p:txBody>
       </p:sp>
+      <p:pic>
+        <p:nvPicPr>
+          <p:cNvPr id="7" name="Picture 6">
+            <a:extLst>
+              <a:ext uri="{FF2B5EF4-FFF2-40B4-BE49-F238E27FC236}">
+                <a16:creationId xmlns:a16="http://schemas.microsoft.com/office/drawing/2014/main" id="{85514AA8-E40C-444A-AAB1-DF836B3D1A6B}"/>
+              </a:ext>
+            </a:extLst>
+          </p:cNvPr>
+          <p:cNvPicPr>
+            <a:picLocks noChangeAspect="1"/>
+          </p:cNvPicPr>
+          <p:nvPr/>
+        </p:nvPicPr>
+        <p:blipFill>
+          <a:blip r:embed="rId3"/>
+          <a:stretch>
+            <a:fillRect/>
+          </a:stretch>
+        </p:blipFill>
+        <p:spPr>
+          <a:xfrm>
+            <a:off x="294980" y="1321329"/>
+            <a:ext cx="7022533" cy="764642"/>
+          </a:xfrm>
+          <a:prstGeom prst="rect">
+            <a:avLst/>
+          </a:prstGeom>
+        </p:spPr>
+      </p:pic>
+      <p:pic>
+        <p:nvPicPr>
+          <p:cNvPr id="13" name="Picture 12">
+            <a:extLst>
+              <a:ext uri="{FF2B5EF4-FFF2-40B4-BE49-F238E27FC236}">
+                <a16:creationId xmlns:a16="http://schemas.microsoft.com/office/drawing/2014/main" id="{BB1F94DE-FFC7-4F0B-9F1E-B5B9BAC0B8E9}"/>
+              </a:ext>
+            </a:extLst>
+          </p:cNvPr>
+          <p:cNvPicPr>
+            <a:picLocks noChangeAspect="1"/>
+          </p:cNvPicPr>
+          <p:nvPr/>
+        </p:nvPicPr>
+        <p:blipFill>
+          <a:blip r:embed="rId4"/>
+          <a:stretch>
+            <a:fillRect/>
+          </a:stretch>
+        </p:blipFill>
+        <p:spPr>
+          <a:xfrm>
+            <a:off x="294980" y="2672327"/>
+            <a:ext cx="10240804" cy="371527"/>
+          </a:xfrm>
+          <a:prstGeom prst="rect">
+            <a:avLst/>
+          </a:prstGeom>
+        </p:spPr>
+      </p:pic>
+      <p:pic>
+        <p:nvPicPr>
+          <p:cNvPr id="17" name="Picture 16">
+            <a:extLst>
+              <a:ext uri="{FF2B5EF4-FFF2-40B4-BE49-F238E27FC236}">
+                <a16:creationId xmlns:a16="http://schemas.microsoft.com/office/drawing/2014/main" id="{1143E811-3954-41A3-9D0D-2207B792E3A2}"/>
+              </a:ext>
+            </a:extLst>
+          </p:cNvPr>
+          <p:cNvPicPr>
+            <a:picLocks noChangeAspect="1"/>
+          </p:cNvPicPr>
+          <p:nvPr/>
+        </p:nvPicPr>
+        <p:blipFill>
+          <a:blip r:embed="rId5"/>
+          <a:stretch>
+            <a:fillRect/>
+          </a:stretch>
+        </p:blipFill>
+        <p:spPr>
+          <a:xfrm>
+            <a:off x="294980" y="2261769"/>
+            <a:ext cx="11117116" cy="275176"/>
+          </a:xfrm>
+          <a:prstGeom prst="rect">
+            <a:avLst/>
+          </a:prstGeom>
+        </p:spPr>
+      </p:pic>
+      <p:pic>
+        <p:nvPicPr>
+          <p:cNvPr id="23" name="Picture 22">
+            <a:extLst>
+              <a:ext uri="{FF2B5EF4-FFF2-40B4-BE49-F238E27FC236}">
+                <a16:creationId xmlns:a16="http://schemas.microsoft.com/office/drawing/2014/main" id="{0F33F889-BE04-4164-A3E7-379D16C3A386}"/>
+              </a:ext>
+            </a:extLst>
+          </p:cNvPr>
+          <p:cNvPicPr>
+            <a:picLocks noChangeAspect="1"/>
+          </p:cNvPicPr>
+          <p:nvPr/>
+        </p:nvPicPr>
+        <p:blipFill>
+          <a:blip r:embed="rId6"/>
+          <a:stretch>
+            <a:fillRect/>
+          </a:stretch>
+        </p:blipFill>
+        <p:spPr>
+          <a:xfrm>
+            <a:off x="294980" y="3361320"/>
+            <a:ext cx="5591955" cy="552527"/>
+          </a:xfrm>
+          <a:prstGeom prst="rect">
+            <a:avLst/>
+          </a:prstGeom>
+        </p:spPr>
+      </p:pic>
+      <p:pic>
+        <p:nvPicPr>
+          <p:cNvPr id="25" name="Picture 24">
+            <a:extLst>
+              <a:ext uri="{FF2B5EF4-FFF2-40B4-BE49-F238E27FC236}">
+                <a16:creationId xmlns:a16="http://schemas.microsoft.com/office/drawing/2014/main" id="{0AD241A0-D20B-421B-BE89-502708AC0605}"/>
+              </a:ext>
+            </a:extLst>
+          </p:cNvPr>
+          <p:cNvPicPr>
+            <a:picLocks noChangeAspect="1"/>
+          </p:cNvPicPr>
+          <p:nvPr/>
+        </p:nvPicPr>
+        <p:blipFill>
+          <a:blip r:embed="rId7"/>
+          <a:stretch>
+            <a:fillRect/>
+          </a:stretch>
+        </p:blipFill>
+        <p:spPr>
+          <a:xfrm>
+            <a:off x="294980" y="4042739"/>
+            <a:ext cx="4667901" cy="581106"/>
+          </a:xfrm>
+          <a:prstGeom prst="rect">
+            <a:avLst/>
+          </a:prstGeom>
+        </p:spPr>
+      </p:pic>
     </p:spTree>
     <p:extLst>
       <p:ext uri="{BB962C8B-B14F-4D97-AF65-F5344CB8AC3E}">
-        <p14:creationId xmlns:p14="http://schemas.microsoft.com/office/powerpoint/2010/main" val="3399154406"/>
+        <p14:creationId xmlns:p14="http://schemas.microsoft.com/office/powerpoint/2010/main" val="670833388"/>
       </p:ext>
     </p:extLst>
   </p:cSld>
@@ -40319,10 +40781,114 @@
       </p:grpSpPr>
       <p:sp>
         <p:nvSpPr>
-          <p:cNvPr id="2" name="Title 1">
-            <a:extLst>
-              <a:ext uri="{FF2B5EF4-FFF2-40B4-BE49-F238E27FC236}">
-                <a16:creationId xmlns:a16="http://schemas.microsoft.com/office/drawing/2014/main" id="{77B87295-CF06-4EF3-BFCA-2F8DAACB6AC6}"/>
+          <p:cNvPr id="3" name="Slide Number Placeholder 2"/>
+          <p:cNvSpPr>
+            <a:spLocks noGrp="1"/>
+          </p:cNvSpPr>
+          <p:nvPr>
+            <p:ph type="sldNum" sz="quarter" idx="12"/>
+          </p:nvPr>
+        </p:nvSpPr>
+        <p:spPr/>
+        <p:txBody>
+          <a:bodyPr/>
+          <a:lstStyle/>
+          <a:p>
+            <a:fld id="{55670E94-029C-4BA8-8D44-FBB339E4924F}" type="slidenum">
+              <a:rPr lang="en-AU" smtClean="0">
+                <a:solidFill>
+                  <a:prstClr val="black">
+                    <a:tint val="75000"/>
+                  </a:prstClr>
+                </a:solidFill>
+              </a:rPr>
+              <a:pPr/>
+              <a:t>51</a:t>
+            </a:fld>
+            <a:endParaRPr lang="en-AU" dirty="0">
+              <a:solidFill>
+                <a:prstClr val="black">
+                  <a:tint val="75000"/>
+                </a:prstClr>
+              </a:solidFill>
+            </a:endParaRPr>
+          </a:p>
+        </p:txBody>
+      </p:sp>
+      <p:sp>
+        <p:nvSpPr>
+          <p:cNvPr id="8" name="Rounded Rectangle 10">
+            <a:extLst>
+              <a:ext uri="{FF2B5EF4-FFF2-40B4-BE49-F238E27FC236}">
+                <a16:creationId xmlns:a16="http://schemas.microsoft.com/office/drawing/2014/main" id="{EFF2A714-4BFE-4265-87E4-34F8FECB8F6F}"/>
+              </a:ext>
+            </a:extLst>
+          </p:cNvPr>
+          <p:cNvSpPr/>
+          <p:nvPr/>
+        </p:nvSpPr>
+        <p:spPr>
+          <a:xfrm>
+            <a:off x="2313" y="641416"/>
+            <a:ext cx="3690801" cy="626513"/>
+          </a:xfrm>
+          <a:prstGeom prst="roundRect">
+            <a:avLst/>
+          </a:prstGeom>
+          <a:noFill/>
+        </p:spPr>
+        <p:style>
+          <a:lnRef idx="0">
+            <a:schemeClr val="accent2"/>
+          </a:lnRef>
+          <a:fillRef idx="3">
+            <a:schemeClr val="accent2"/>
+          </a:fillRef>
+          <a:effectRef idx="3">
+            <a:schemeClr val="accent2"/>
+          </a:effectRef>
+          <a:fontRef idx="minor">
+            <a:schemeClr val="lt1"/>
+          </a:fontRef>
+        </p:style>
+        <p:txBody>
+          <a:bodyPr rtlCol="0" anchor="ctr"/>
+          <a:lstStyle/>
+          <a:p>
+            <a:pPr algn="ctr"/>
+            <a:r>
+              <a:rPr lang="en-AU" sz="2800" b="1" dirty="0">
+                <a:ln>
+                  <a:solidFill>
+                    <a:schemeClr val="bg1">
+                      <a:lumMod val="75000"/>
+                      <a:lumOff val="25000"/>
+                      <a:alpha val="10000"/>
+                    </a:schemeClr>
+                  </a:solidFill>
+                </a:ln>
+                <a:solidFill>
+                  <a:schemeClr val="tx1"/>
+                </a:solidFill>
+                <a:effectLst>
+                  <a:outerShdw blurRad="9525" dist="25400" dir="14640000" algn="tl" rotWithShape="0">
+                    <a:schemeClr val="bg1">
+                      <a:alpha val="30000"/>
+                    </a:schemeClr>
+                  </a:outerShdw>
+                </a:effectLst>
+              </a:rPr>
+              <a:t>How to run the demo</a:t>
+            </a:r>
+          </a:p>
+        </p:txBody>
+      </p:sp>
+      <p:sp>
+        <p:nvSpPr>
+          <p:cNvPr id="9" name="Title 1">
+            <a:extLst>
+              <a:ext uri="{FF2B5EF4-FFF2-40B4-BE49-F238E27FC236}">
+                <a16:creationId xmlns:a16="http://schemas.microsoft.com/office/drawing/2014/main" id="{9D0A4A63-5354-4BB5-8832-B9DB46F783E9}"/>
               </a:ext>
             </a:extLst>
           </p:cNvPr>
@@ -40336,7 +40902,7 @@
         <p:spPr>
           <a:xfrm>
             <a:off x="919119" y="81280"/>
-            <a:ext cx="10353762" cy="1257300"/>
+            <a:ext cx="10353762" cy="745355"/>
           </a:xfrm>
         </p:spPr>
         <p:txBody>
@@ -40350,69 +40916,160 @@
           </a:p>
         </p:txBody>
       </p:sp>
-      <p:sp>
-        <p:nvSpPr>
-          <p:cNvPr id="3" name="Content Placeholder 2">
-            <a:extLst>
-              <a:ext uri="{FF2B5EF4-FFF2-40B4-BE49-F238E27FC236}">
-                <a16:creationId xmlns:a16="http://schemas.microsoft.com/office/drawing/2014/main" id="{21E8586B-D9A3-4AE1-A171-491E51F2FAF0}"/>
-              </a:ext>
-            </a:extLst>
-          </p:cNvPr>
-          <p:cNvSpPr>
-            <a:spLocks noGrp="1"/>
-          </p:cNvSpPr>
-          <p:nvPr>
-            <p:ph idx="1"/>
-          </p:nvPr>
-        </p:nvSpPr>
-        <p:spPr>
-          <a:xfrm>
-            <a:off x="548034" y="1362710"/>
-            <a:ext cx="11315719" cy="3714749"/>
-          </a:xfrm>
-        </p:spPr>
-        <p:txBody>
-          <a:bodyPr>
-            <a:noAutofit/>
-          </a:bodyPr>
-          <a:lstStyle/>
-          <a:p>
-            <a:r>
-              <a:rPr lang="en-US" sz="2800" dirty="0"/>
-              <a:t>List a few practical use-cases of YARA in cybersecurity</a:t>
-            </a:r>
-          </a:p>
-          <a:p>
-            <a:pPr marL="36900" indent="0">
-              <a:buNone/>
-            </a:pPr>
-            <a:endParaRPr lang="en-AU" sz="2800" dirty="0"/>
-          </a:p>
-          <a:p>
-            <a:pPr lvl="1"/>
-            <a:endParaRPr lang="en-AU" sz="2800" dirty="0"/>
-          </a:p>
-          <a:p>
-            <a:pPr lvl="1"/>
-            <a:endParaRPr lang="en-AU" sz="2800" dirty="0"/>
-          </a:p>
-          <a:p>
-            <a:pPr lvl="1"/>
-            <a:endParaRPr lang="en-AU" sz="2800" dirty="0"/>
-          </a:p>
-          <a:p>
-            <a:pPr marL="450000" lvl="1" indent="0">
-              <a:buNone/>
-            </a:pPr>
-            <a:endParaRPr lang="en-AU" sz="2800" dirty="0"/>
-          </a:p>
-        </p:txBody>
-      </p:sp>
+      <p:pic>
+        <p:nvPicPr>
+          <p:cNvPr id="7" name="Picture 6">
+            <a:extLst>
+              <a:ext uri="{FF2B5EF4-FFF2-40B4-BE49-F238E27FC236}">
+                <a16:creationId xmlns:a16="http://schemas.microsoft.com/office/drawing/2014/main" id="{85514AA8-E40C-444A-AAB1-DF836B3D1A6B}"/>
+              </a:ext>
+            </a:extLst>
+          </p:cNvPr>
+          <p:cNvPicPr>
+            <a:picLocks noChangeAspect="1"/>
+          </p:cNvPicPr>
+          <p:nvPr/>
+        </p:nvPicPr>
+        <p:blipFill>
+          <a:blip r:embed="rId3"/>
+          <a:stretch>
+            <a:fillRect/>
+          </a:stretch>
+        </p:blipFill>
+        <p:spPr>
+          <a:xfrm>
+            <a:off x="294980" y="1321329"/>
+            <a:ext cx="7022533" cy="764642"/>
+          </a:xfrm>
+          <a:prstGeom prst="rect">
+            <a:avLst/>
+          </a:prstGeom>
+        </p:spPr>
+      </p:pic>
+      <p:pic>
+        <p:nvPicPr>
+          <p:cNvPr id="13" name="Picture 12">
+            <a:extLst>
+              <a:ext uri="{FF2B5EF4-FFF2-40B4-BE49-F238E27FC236}">
+                <a16:creationId xmlns:a16="http://schemas.microsoft.com/office/drawing/2014/main" id="{BB1F94DE-FFC7-4F0B-9F1E-B5B9BAC0B8E9}"/>
+              </a:ext>
+            </a:extLst>
+          </p:cNvPr>
+          <p:cNvPicPr>
+            <a:picLocks noChangeAspect="1"/>
+          </p:cNvPicPr>
+          <p:nvPr/>
+        </p:nvPicPr>
+        <p:blipFill>
+          <a:blip r:embed="rId4"/>
+          <a:stretch>
+            <a:fillRect/>
+          </a:stretch>
+        </p:blipFill>
+        <p:spPr>
+          <a:xfrm>
+            <a:off x="294980" y="2672327"/>
+            <a:ext cx="10240804" cy="371527"/>
+          </a:xfrm>
+          <a:prstGeom prst="rect">
+            <a:avLst/>
+          </a:prstGeom>
+        </p:spPr>
+      </p:pic>
+      <p:pic>
+        <p:nvPicPr>
+          <p:cNvPr id="17" name="Picture 16">
+            <a:extLst>
+              <a:ext uri="{FF2B5EF4-FFF2-40B4-BE49-F238E27FC236}">
+                <a16:creationId xmlns:a16="http://schemas.microsoft.com/office/drawing/2014/main" id="{1143E811-3954-41A3-9D0D-2207B792E3A2}"/>
+              </a:ext>
+            </a:extLst>
+          </p:cNvPr>
+          <p:cNvPicPr>
+            <a:picLocks noChangeAspect="1"/>
+          </p:cNvPicPr>
+          <p:nvPr/>
+        </p:nvPicPr>
+        <p:blipFill>
+          <a:blip r:embed="rId5"/>
+          <a:stretch>
+            <a:fillRect/>
+          </a:stretch>
+        </p:blipFill>
+        <p:spPr>
+          <a:xfrm>
+            <a:off x="294980" y="2261769"/>
+            <a:ext cx="11117116" cy="275176"/>
+          </a:xfrm>
+          <a:prstGeom prst="rect">
+            <a:avLst/>
+          </a:prstGeom>
+        </p:spPr>
+      </p:pic>
+      <p:pic>
+        <p:nvPicPr>
+          <p:cNvPr id="19" name="Picture 18">
+            <a:extLst>
+              <a:ext uri="{FF2B5EF4-FFF2-40B4-BE49-F238E27FC236}">
+                <a16:creationId xmlns:a16="http://schemas.microsoft.com/office/drawing/2014/main" id="{3F4B1488-7010-4F58-A666-F2A73FC7E724}"/>
+              </a:ext>
+            </a:extLst>
+          </p:cNvPr>
+          <p:cNvPicPr>
+            <a:picLocks noChangeAspect="1"/>
+          </p:cNvPicPr>
+          <p:nvPr/>
+        </p:nvPicPr>
+        <p:blipFill>
+          <a:blip r:embed="rId6"/>
+          <a:stretch>
+            <a:fillRect/>
+          </a:stretch>
+        </p:blipFill>
+        <p:spPr>
+          <a:xfrm>
+            <a:off x="294980" y="3212891"/>
+            <a:ext cx="5122715" cy="308214"/>
+          </a:xfrm>
+          <a:prstGeom prst="rect">
+            <a:avLst/>
+          </a:prstGeom>
+        </p:spPr>
+      </p:pic>
+      <p:pic>
+        <p:nvPicPr>
+          <p:cNvPr id="21" name="Picture 20">
+            <a:extLst>
+              <a:ext uri="{FF2B5EF4-FFF2-40B4-BE49-F238E27FC236}">
+                <a16:creationId xmlns:a16="http://schemas.microsoft.com/office/drawing/2014/main" id="{1BCA2303-2DAF-4998-BB98-CC68048816D7}"/>
+              </a:ext>
+            </a:extLst>
+          </p:cNvPr>
+          <p:cNvPicPr>
+            <a:picLocks noChangeAspect="1"/>
+          </p:cNvPicPr>
+          <p:nvPr/>
+        </p:nvPicPr>
+        <p:blipFill>
+          <a:blip r:embed="rId7"/>
+          <a:stretch>
+            <a:fillRect/>
+          </a:stretch>
+        </p:blipFill>
+        <p:spPr>
+          <a:xfrm>
+            <a:off x="292667" y="3690142"/>
+            <a:ext cx="10794898" cy="2656158"/>
+          </a:xfrm>
+          <a:prstGeom prst="rect">
+            <a:avLst/>
+          </a:prstGeom>
+        </p:spPr>
+      </p:pic>
     </p:spTree>
     <p:extLst>
       <p:ext uri="{BB962C8B-B14F-4D97-AF65-F5344CB8AC3E}">
-        <p14:creationId xmlns:p14="http://schemas.microsoft.com/office/powerpoint/2010/main" val="2758315679"/>
+        <p14:creationId xmlns:p14="http://schemas.microsoft.com/office/powerpoint/2010/main" val="3766602079"/>
       </p:ext>
     </p:extLst>
   </p:cSld>
@@ -40441,10 +41098,114 @@
       </p:grpSpPr>
       <p:sp>
         <p:nvSpPr>
-          <p:cNvPr id="2" name="Title 1">
-            <a:extLst>
-              <a:ext uri="{FF2B5EF4-FFF2-40B4-BE49-F238E27FC236}">
-                <a16:creationId xmlns:a16="http://schemas.microsoft.com/office/drawing/2014/main" id="{77B87295-CF06-4EF3-BFCA-2F8DAACB6AC6}"/>
+          <p:cNvPr id="3" name="Slide Number Placeholder 2"/>
+          <p:cNvSpPr>
+            <a:spLocks noGrp="1"/>
+          </p:cNvSpPr>
+          <p:nvPr>
+            <p:ph type="sldNum" sz="quarter" idx="12"/>
+          </p:nvPr>
+        </p:nvSpPr>
+        <p:spPr/>
+        <p:txBody>
+          <a:bodyPr/>
+          <a:lstStyle/>
+          <a:p>
+            <a:fld id="{55670E94-029C-4BA8-8D44-FBB339E4924F}" type="slidenum">
+              <a:rPr lang="en-AU" smtClean="0">
+                <a:solidFill>
+                  <a:prstClr val="black">
+                    <a:tint val="75000"/>
+                  </a:prstClr>
+                </a:solidFill>
+              </a:rPr>
+              <a:pPr/>
+              <a:t>52</a:t>
+            </a:fld>
+            <a:endParaRPr lang="en-AU" dirty="0">
+              <a:solidFill>
+                <a:prstClr val="black">
+                  <a:tint val="75000"/>
+                </a:prstClr>
+              </a:solidFill>
+            </a:endParaRPr>
+          </a:p>
+        </p:txBody>
+      </p:sp>
+      <p:sp>
+        <p:nvSpPr>
+          <p:cNvPr id="8" name="Rounded Rectangle 10">
+            <a:extLst>
+              <a:ext uri="{FF2B5EF4-FFF2-40B4-BE49-F238E27FC236}">
+                <a16:creationId xmlns:a16="http://schemas.microsoft.com/office/drawing/2014/main" id="{EFF2A714-4BFE-4265-87E4-34F8FECB8F6F}"/>
+              </a:ext>
+            </a:extLst>
+          </p:cNvPr>
+          <p:cNvSpPr/>
+          <p:nvPr/>
+        </p:nvSpPr>
+        <p:spPr>
+          <a:xfrm>
+            <a:off x="292667" y="986987"/>
+            <a:ext cx="1970473" cy="639549"/>
+          </a:xfrm>
+          <a:prstGeom prst="roundRect">
+            <a:avLst/>
+          </a:prstGeom>
+          <a:noFill/>
+        </p:spPr>
+        <p:style>
+          <a:lnRef idx="0">
+            <a:schemeClr val="accent2"/>
+          </a:lnRef>
+          <a:fillRef idx="3">
+            <a:schemeClr val="accent2"/>
+          </a:fillRef>
+          <a:effectRef idx="3">
+            <a:schemeClr val="accent2"/>
+          </a:effectRef>
+          <a:fontRef idx="minor">
+            <a:schemeClr val="lt1"/>
+          </a:fontRef>
+        </p:style>
+        <p:txBody>
+          <a:bodyPr rtlCol="0" anchor="ctr"/>
+          <a:lstStyle/>
+          <a:p>
+            <a:pPr algn="ctr"/>
+            <a:r>
+              <a:rPr lang="en-AU" sz="2800" b="1" dirty="0">
+                <a:ln>
+                  <a:solidFill>
+                    <a:schemeClr val="bg1">
+                      <a:lumMod val="75000"/>
+                      <a:lumOff val="25000"/>
+                      <a:alpha val="10000"/>
+                    </a:schemeClr>
+                  </a:solidFill>
+                </a:ln>
+                <a:solidFill>
+                  <a:schemeClr val="tx1"/>
+                </a:solidFill>
+                <a:effectLst>
+                  <a:outerShdw blurRad="9525" dist="25400" dir="14640000" algn="tl" rotWithShape="0">
+                    <a:schemeClr val="bg1">
+                      <a:alpha val="30000"/>
+                    </a:schemeClr>
+                  </a:outerShdw>
+                </a:effectLst>
+              </a:rPr>
+              <a:t>demo</a:t>
+            </a:r>
+          </a:p>
+        </p:txBody>
+      </p:sp>
+      <p:sp>
+        <p:nvSpPr>
+          <p:cNvPr id="9" name="Title 1">
+            <a:extLst>
+              <a:ext uri="{FF2B5EF4-FFF2-40B4-BE49-F238E27FC236}">
+                <a16:creationId xmlns:a16="http://schemas.microsoft.com/office/drawing/2014/main" id="{9D0A4A63-5354-4BB5-8832-B9DB46F783E9}"/>
               </a:ext>
             </a:extLst>
           </p:cNvPr>
@@ -40458,7 +41219,7 @@
         <p:spPr>
           <a:xfrm>
             <a:off x="919119" y="81280"/>
-            <a:ext cx="10353762" cy="1257300"/>
+            <a:ext cx="10353762" cy="1052094"/>
           </a:xfrm>
         </p:spPr>
         <p:txBody>
@@ -40469,84 +41230,13 @@
               <a:rPr lang="en-AU" dirty="0"/>
               <a:t>Malware Detection</a:t>
             </a:r>
-          </a:p>
-        </p:txBody>
-      </p:sp>
-      <p:sp>
-        <p:nvSpPr>
-          <p:cNvPr id="3" name="Content Placeholder 2">
-            <a:extLst>
-              <a:ext uri="{FF2B5EF4-FFF2-40B4-BE49-F238E27FC236}">
-                <a16:creationId xmlns:a16="http://schemas.microsoft.com/office/drawing/2014/main" id="{21E8586B-D9A3-4AE1-A171-491E51F2FAF0}"/>
-              </a:ext>
-            </a:extLst>
-          </p:cNvPr>
-          <p:cNvSpPr>
-            <a:spLocks noGrp="1"/>
-          </p:cNvSpPr>
-          <p:nvPr>
-            <p:ph idx="1"/>
-          </p:nvPr>
-        </p:nvSpPr>
-        <p:spPr>
-          <a:xfrm>
-            <a:off x="548034" y="1362710"/>
-            <a:ext cx="11315719" cy="3714749"/>
-          </a:xfrm>
-        </p:spPr>
-        <p:txBody>
-          <a:bodyPr>
-            <a:noAutofit/>
-          </a:bodyPr>
-          <a:lstStyle/>
-          <a:p>
-            <a:r>
-              <a:rPr lang="en-US" sz="2800" dirty="0"/>
-              <a:t>List a few practical use-cases of YARA in cybersecurity</a:t>
-            </a:r>
-          </a:p>
-          <a:p>
-            <a:pPr lvl="1"/>
-            <a:r>
-              <a:rPr lang="en-US" sz="2800" dirty="0"/>
-              <a:t>e.g., </a:t>
-            </a:r>
-            <a:r>
-              <a:rPr lang="en-AU" sz="2800" dirty="0"/>
-              <a:t>malware detection/intrusion detection/system monitoring</a:t>
-            </a:r>
-            <a:endParaRPr lang="en-US" sz="2800" dirty="0"/>
-          </a:p>
-          <a:p>
-            <a:pPr marL="36900" indent="0">
-              <a:buNone/>
-            </a:pPr>
-            <a:endParaRPr lang="en-AU" sz="2800" dirty="0"/>
-          </a:p>
-          <a:p>
-            <a:pPr lvl="1"/>
-            <a:endParaRPr lang="en-AU" sz="2800" dirty="0"/>
-          </a:p>
-          <a:p>
-            <a:pPr lvl="1"/>
-            <a:endParaRPr lang="en-AU" sz="2800" dirty="0"/>
-          </a:p>
-          <a:p>
-            <a:pPr lvl="1"/>
-            <a:endParaRPr lang="en-AU" sz="2800" dirty="0"/>
-          </a:p>
-          <a:p>
-            <a:pPr marL="450000" lvl="1" indent="0">
-              <a:buNone/>
-            </a:pPr>
-            <a:endParaRPr lang="en-AU" sz="2800" dirty="0"/>
           </a:p>
         </p:txBody>
       </p:sp>
     </p:spTree>
     <p:extLst>
       <p:ext uri="{BB962C8B-B14F-4D97-AF65-F5344CB8AC3E}">
-        <p14:creationId xmlns:p14="http://schemas.microsoft.com/office/powerpoint/2010/main" val="2761264589"/>
+        <p14:creationId xmlns:p14="http://schemas.microsoft.com/office/powerpoint/2010/main" val="3399154406"/>
       </p:ext>
     </p:extLst>
   </p:cSld>
@@ -40578,7 +41268,7 @@
           <p:cNvPr id="2" name="Title 1">
             <a:extLst>
               <a:ext uri="{FF2B5EF4-FFF2-40B4-BE49-F238E27FC236}">
-                <a16:creationId xmlns:a16="http://schemas.microsoft.com/office/drawing/2014/main" id="{A2E9C478-AE76-4FD5-8984-90B18062A23A}"/>
+                <a16:creationId xmlns:a16="http://schemas.microsoft.com/office/drawing/2014/main" id="{77B87295-CF06-4EF3-BFCA-2F8DAACB6AC6}"/>
               </a:ext>
             </a:extLst>
           </p:cNvPr>
@@ -40591,8 +41281,8 @@
         </p:nvSpPr>
         <p:spPr>
           <a:xfrm>
-            <a:off x="919119" y="142240"/>
-            <a:ext cx="10353762" cy="934720"/>
+            <a:off x="919119" y="81280"/>
+            <a:ext cx="10353762" cy="1257300"/>
           </a:xfrm>
         </p:spPr>
         <p:txBody>
@@ -40611,7 +41301,7 @@
           <p:cNvPr id="3" name="Content Placeholder 2">
             <a:extLst>
               <a:ext uri="{FF2B5EF4-FFF2-40B4-BE49-F238E27FC236}">
-                <a16:creationId xmlns:a16="http://schemas.microsoft.com/office/drawing/2014/main" id="{FF38BB1A-17C7-4CE4-80F8-423DE683961B}"/>
+                <a16:creationId xmlns:a16="http://schemas.microsoft.com/office/drawing/2014/main" id="{21E8586B-D9A3-4AE1-A171-491E51F2FAF0}"/>
               </a:ext>
             </a:extLst>
           </p:cNvPr>
@@ -40624,57 +41314,51 @@
         </p:nvSpPr>
         <p:spPr>
           <a:xfrm>
-            <a:off x="710595" y="1162050"/>
-            <a:ext cx="10353762" cy="4913630"/>
+            <a:off x="548034" y="1362710"/>
+            <a:ext cx="11315719" cy="3714749"/>
           </a:xfrm>
         </p:spPr>
         <p:txBody>
           <a:bodyPr>
-            <a:normAutofit/>
+            <a:noAutofit/>
           </a:bodyPr>
           <a:lstStyle/>
           <a:p>
             <a:r>
-              <a:rPr lang="en-AU" sz="3000" dirty="0"/>
-              <a:t>Ember is an AI-based signature detection tool.</a:t>
-            </a:r>
+              <a:rPr lang="en-US" sz="2800" dirty="0"/>
+              <a:t>List a few practical use-cases of YARA in cybersecurity</a:t>
+            </a:r>
+          </a:p>
+          <a:p>
+            <a:pPr marL="36900" indent="0">
+              <a:buNone/>
+            </a:pPr>
+            <a:endParaRPr lang="en-AU" sz="2800" dirty="0"/>
           </a:p>
           <a:p>
             <a:pPr lvl="1"/>
-            <a:r>
-              <a:rPr lang="en-AU" sz="3000" dirty="0"/>
-              <a:t>It </a:t>
-            </a:r>
-            <a:r>
-              <a:rPr lang="en-AU" sz="3200" dirty="0"/>
-              <a:t>is an open-source project. </a:t>
-            </a:r>
-            <a:endParaRPr lang="en-AU" sz="3000" dirty="0"/>
+            <a:endParaRPr lang="en-AU" sz="2800" dirty="0"/>
           </a:p>
           <a:p>
             <a:pPr lvl="1"/>
-            <a:r>
-              <a:rPr lang="en-AU" sz="3000" dirty="0"/>
-              <a:t>It uses a deep-learning-based model to predict whether a given file is malicious.</a:t>
-            </a:r>
+            <a:endParaRPr lang="en-AU" sz="2800" dirty="0"/>
           </a:p>
           <a:p>
             <a:pPr lvl="1"/>
-            <a:r>
-              <a:rPr lang="en-AU" sz="3000" dirty="0"/>
-              <a:t>The file type is limited to windows-specific PE (portable executable). </a:t>
-            </a:r>
-          </a:p>
-          <a:p>
-            <a:pPr lvl="1"/>
-            <a:endParaRPr lang="en-AU" sz="3000" dirty="0"/>
+            <a:endParaRPr lang="en-AU" sz="2800" dirty="0"/>
+          </a:p>
+          <a:p>
+            <a:pPr marL="450000" lvl="1" indent="0">
+              <a:buNone/>
+            </a:pPr>
+            <a:endParaRPr lang="en-AU" sz="2800" dirty="0"/>
           </a:p>
         </p:txBody>
       </p:sp>
     </p:spTree>
     <p:extLst>
       <p:ext uri="{BB962C8B-B14F-4D97-AF65-F5344CB8AC3E}">
-        <p14:creationId xmlns:p14="http://schemas.microsoft.com/office/powerpoint/2010/main" val="835046270"/>
+        <p14:creationId xmlns:p14="http://schemas.microsoft.com/office/powerpoint/2010/main" val="2758315679"/>
       </p:ext>
     </p:extLst>
   </p:cSld>
@@ -40703,114 +41387,10 @@
       </p:grpSpPr>
       <p:sp>
         <p:nvSpPr>
-          <p:cNvPr id="3" name="Slide Number Placeholder 2"/>
-          <p:cNvSpPr>
-            <a:spLocks noGrp="1"/>
-          </p:cNvSpPr>
-          <p:nvPr>
-            <p:ph type="sldNum" sz="quarter" idx="12"/>
-          </p:nvPr>
-        </p:nvSpPr>
-        <p:spPr/>
-        <p:txBody>
-          <a:bodyPr/>
-          <a:lstStyle/>
-          <a:p>
-            <a:fld id="{55670E94-029C-4BA8-8D44-FBB339E4924F}" type="slidenum">
-              <a:rPr lang="en-AU" smtClean="0">
-                <a:solidFill>
-                  <a:prstClr val="black">
-                    <a:tint val="75000"/>
-                  </a:prstClr>
-                </a:solidFill>
-              </a:rPr>
-              <a:pPr/>
-              <a:t>54</a:t>
-            </a:fld>
-            <a:endParaRPr lang="en-AU" dirty="0">
-              <a:solidFill>
-                <a:prstClr val="black">
-                  <a:tint val="75000"/>
-                </a:prstClr>
-              </a:solidFill>
-            </a:endParaRPr>
-          </a:p>
-        </p:txBody>
-      </p:sp>
-      <p:sp>
-        <p:nvSpPr>
-          <p:cNvPr id="8" name="Rounded Rectangle 10">
-            <a:extLst>
-              <a:ext uri="{FF2B5EF4-FFF2-40B4-BE49-F238E27FC236}">
-                <a16:creationId xmlns:a16="http://schemas.microsoft.com/office/drawing/2014/main" id="{EFF2A714-4BFE-4265-87E4-34F8FECB8F6F}"/>
-              </a:ext>
-            </a:extLst>
-          </p:cNvPr>
-          <p:cNvSpPr/>
-          <p:nvPr/>
-        </p:nvSpPr>
-        <p:spPr>
-          <a:xfrm>
-            <a:off x="292667" y="986987"/>
-            <a:ext cx="4325053" cy="639549"/>
-          </a:xfrm>
-          <a:prstGeom prst="roundRect">
-            <a:avLst/>
-          </a:prstGeom>
-          <a:noFill/>
-        </p:spPr>
-        <p:style>
-          <a:lnRef idx="0">
-            <a:schemeClr val="accent2"/>
-          </a:lnRef>
-          <a:fillRef idx="3">
-            <a:schemeClr val="accent2"/>
-          </a:fillRef>
-          <a:effectRef idx="3">
-            <a:schemeClr val="accent2"/>
-          </a:effectRef>
-          <a:fontRef idx="minor">
-            <a:schemeClr val="lt1"/>
-          </a:fontRef>
-        </p:style>
-        <p:txBody>
-          <a:bodyPr rtlCol="0" anchor="ctr"/>
-          <a:lstStyle/>
-          <a:p>
-            <a:pPr algn="ctr"/>
-            <a:r>
-              <a:rPr lang="en-AU" sz="2800" b="1" dirty="0">
-                <a:ln>
-                  <a:solidFill>
-                    <a:schemeClr val="bg1">
-                      <a:lumMod val="75000"/>
-                      <a:lumOff val="25000"/>
-                      <a:alpha val="10000"/>
-                    </a:schemeClr>
-                  </a:solidFill>
-                </a:ln>
-                <a:solidFill>
-                  <a:schemeClr val="tx1"/>
-                </a:solidFill>
-                <a:effectLst>
-                  <a:outerShdw blurRad="9525" dist="25400" dir="14640000" algn="tl" rotWithShape="0">
-                    <a:schemeClr val="bg1">
-                      <a:alpha val="30000"/>
-                    </a:schemeClr>
-                  </a:outerShdw>
-                </a:effectLst>
-              </a:rPr>
-              <a:t>How to run the demo</a:t>
-            </a:r>
-          </a:p>
-        </p:txBody>
-      </p:sp>
-      <p:sp>
-        <p:nvSpPr>
-          <p:cNvPr id="9" name="Title 1">
-            <a:extLst>
-              <a:ext uri="{FF2B5EF4-FFF2-40B4-BE49-F238E27FC236}">
-                <a16:creationId xmlns:a16="http://schemas.microsoft.com/office/drawing/2014/main" id="{9D0A4A63-5354-4BB5-8832-B9DB46F783E9}"/>
+          <p:cNvPr id="2" name="Title 1">
+            <a:extLst>
+              <a:ext uri="{FF2B5EF4-FFF2-40B4-BE49-F238E27FC236}">
+                <a16:creationId xmlns:a16="http://schemas.microsoft.com/office/drawing/2014/main" id="{77B87295-CF06-4EF3-BFCA-2F8DAACB6AC6}"/>
               </a:ext>
             </a:extLst>
           </p:cNvPr>
@@ -40824,7 +41404,7 @@
         <p:spPr>
           <a:xfrm>
             <a:off x="919119" y="81280"/>
-            <a:ext cx="10353762" cy="1052094"/>
+            <a:ext cx="10353762" cy="1257300"/>
           </a:xfrm>
         </p:spPr>
         <p:txBody>
@@ -40840,10 +41420,10 @@
       </p:sp>
       <p:sp>
         <p:nvSpPr>
-          <p:cNvPr id="12" name="Content Placeholder 2">
-            <a:extLst>
-              <a:ext uri="{FF2B5EF4-FFF2-40B4-BE49-F238E27FC236}">
-                <a16:creationId xmlns:a16="http://schemas.microsoft.com/office/drawing/2014/main" id="{C35F5975-2C76-4F59-A37E-82C404CDCDDD}"/>
+          <p:cNvPr id="3" name="Content Placeholder 2">
+            <a:extLst>
+              <a:ext uri="{FF2B5EF4-FFF2-40B4-BE49-F238E27FC236}">
+                <a16:creationId xmlns:a16="http://schemas.microsoft.com/office/drawing/2014/main" id="{21E8586B-D9A3-4AE1-A171-491E51F2FAF0}"/>
               </a:ext>
             </a:extLst>
           </p:cNvPr>
@@ -40856,8 +41436,8 @@
         </p:nvSpPr>
         <p:spPr>
           <a:xfrm>
-            <a:off x="727896" y="1709687"/>
-            <a:ext cx="10353762" cy="3714749"/>
+            <a:off x="548034" y="1362710"/>
+            <a:ext cx="11315719" cy="3714749"/>
           </a:xfrm>
         </p:spPr>
         <p:txBody>
@@ -40867,79 +41447,52 @@
           <a:lstStyle/>
           <a:p>
             <a:r>
-              <a:rPr lang="en-US" sz="2800" dirty="0" err="1">
-                <a:solidFill>
-                  <a:schemeClr val="tx1"/>
-                </a:solidFill>
-                <a:effectLst/>
-              </a:rPr>
-              <a:t>sudo</a:t>
-            </a:r>
-            <a:r>
-              <a:rPr lang="en-US" sz="2800" dirty="0">
-                <a:solidFill>
-                  <a:schemeClr val="tx1"/>
-                </a:solidFill>
-                <a:effectLst/>
-              </a:rPr>
-              <a:t> docker run -it --rm </a:t>
-            </a:r>
-            <a:r>
-              <a:rPr lang="en-US" sz="2800" dirty="0" err="1">
-                <a:solidFill>
-                  <a:schemeClr val="tx1"/>
-                </a:solidFill>
-                <a:effectLst/>
-              </a:rPr>
-              <a:t>uwacyber</a:t>
-            </a:r>
-            <a:r>
-              <a:rPr lang="en-US" sz="2800" dirty="0">
-                <a:solidFill>
-                  <a:schemeClr val="tx1"/>
-                </a:solidFill>
-                <a:effectLst/>
-              </a:rPr>
-              <a:t>/cits1003-labs:ai-malware</a:t>
-            </a:r>
-          </a:p>
-          <a:p>
-            <a:r>
-              <a:rPr lang="en-AU" sz="2800" dirty="0">
-                <a:solidFill>
-                  <a:schemeClr val="tx1"/>
-                </a:solidFill>
-                <a:effectLst/>
-              </a:rPr>
-              <a:t>python3 scripts/classify_binaries.py -m ember_model_2018.txt /opt/malware-sample-library/Trojans/</a:t>
-            </a:r>
-            <a:r>
-              <a:rPr lang="en-AU" sz="2800" dirty="0" err="1">
-                <a:solidFill>
-                  <a:schemeClr val="tx1"/>
-                </a:solidFill>
-                <a:effectLst/>
-              </a:rPr>
-              <a:t>NanocoreRAT.bin</a:t>
-            </a:r>
-            <a:endParaRPr lang="en-AU" sz="2800" dirty="0">
-              <a:solidFill>
-                <a:schemeClr val="tx1"/>
-              </a:solidFill>
-              <a:effectLst/>
-            </a:endParaRPr>
-          </a:p>
-          <a:p>
-            <a:endParaRPr lang="en-AU" sz="2800" dirty="0">
-              <a:effectLst/>
-            </a:endParaRPr>
+              <a:rPr lang="en-US" sz="2800" dirty="0"/>
+              <a:t>List a few practical use-cases of YARA in cybersecurity</a:t>
+            </a:r>
+          </a:p>
+          <a:p>
+            <a:pPr lvl="1"/>
+            <a:r>
+              <a:rPr lang="en-US" sz="2800" dirty="0"/>
+              <a:t>e.g., </a:t>
+            </a:r>
+            <a:r>
+              <a:rPr lang="en-AU" sz="2800" dirty="0"/>
+              <a:t>malware detection/intrusion detection/system monitoring</a:t>
+            </a:r>
+            <a:endParaRPr lang="en-US" sz="2800" dirty="0"/>
+          </a:p>
+          <a:p>
+            <a:pPr marL="36900" indent="0">
+              <a:buNone/>
+            </a:pPr>
+            <a:endParaRPr lang="en-AU" sz="2800" dirty="0"/>
+          </a:p>
+          <a:p>
+            <a:pPr lvl="1"/>
+            <a:endParaRPr lang="en-AU" sz="2800" dirty="0"/>
+          </a:p>
+          <a:p>
+            <a:pPr lvl="1"/>
+            <a:endParaRPr lang="en-AU" sz="2800" dirty="0"/>
+          </a:p>
+          <a:p>
+            <a:pPr lvl="1"/>
+            <a:endParaRPr lang="en-AU" sz="2800" dirty="0"/>
+          </a:p>
+          <a:p>
+            <a:pPr marL="450000" lvl="1" indent="0">
+              <a:buNone/>
+            </a:pPr>
+            <a:endParaRPr lang="en-AU" sz="2800" dirty="0"/>
           </a:p>
         </p:txBody>
       </p:sp>
     </p:spTree>
     <p:extLst>
       <p:ext uri="{BB962C8B-B14F-4D97-AF65-F5344CB8AC3E}">
-        <p14:creationId xmlns:p14="http://schemas.microsoft.com/office/powerpoint/2010/main" val="2862420244"/>
+        <p14:creationId xmlns:p14="http://schemas.microsoft.com/office/powerpoint/2010/main" val="2761264589"/>
       </p:ext>
     </p:extLst>
   </p:cSld>
@@ -40968,114 +41521,10 @@
       </p:grpSpPr>
       <p:sp>
         <p:nvSpPr>
-          <p:cNvPr id="3" name="Slide Number Placeholder 2"/>
-          <p:cNvSpPr>
-            <a:spLocks noGrp="1"/>
-          </p:cNvSpPr>
-          <p:nvPr>
-            <p:ph type="sldNum" sz="quarter" idx="12"/>
-          </p:nvPr>
-        </p:nvSpPr>
-        <p:spPr/>
-        <p:txBody>
-          <a:bodyPr/>
-          <a:lstStyle/>
-          <a:p>
-            <a:fld id="{55670E94-029C-4BA8-8D44-FBB339E4924F}" type="slidenum">
-              <a:rPr lang="en-AU" smtClean="0">
-                <a:solidFill>
-                  <a:prstClr val="black">
-                    <a:tint val="75000"/>
-                  </a:prstClr>
-                </a:solidFill>
-              </a:rPr>
-              <a:pPr/>
-              <a:t>55</a:t>
-            </a:fld>
-            <a:endParaRPr lang="en-AU" dirty="0">
-              <a:solidFill>
-                <a:prstClr val="black">
-                  <a:tint val="75000"/>
-                </a:prstClr>
-              </a:solidFill>
-            </a:endParaRPr>
-          </a:p>
-        </p:txBody>
-      </p:sp>
-      <p:sp>
-        <p:nvSpPr>
-          <p:cNvPr id="8" name="Rounded Rectangle 10">
-            <a:extLst>
-              <a:ext uri="{FF2B5EF4-FFF2-40B4-BE49-F238E27FC236}">
-                <a16:creationId xmlns:a16="http://schemas.microsoft.com/office/drawing/2014/main" id="{EFF2A714-4BFE-4265-87E4-34F8FECB8F6F}"/>
-              </a:ext>
-            </a:extLst>
-          </p:cNvPr>
-          <p:cNvSpPr/>
-          <p:nvPr/>
-        </p:nvSpPr>
-        <p:spPr>
-          <a:xfrm>
-            <a:off x="292667" y="986987"/>
-            <a:ext cx="1688533" cy="639549"/>
-          </a:xfrm>
-          <a:prstGeom prst="roundRect">
-            <a:avLst/>
-          </a:prstGeom>
-          <a:noFill/>
-        </p:spPr>
-        <p:style>
-          <a:lnRef idx="0">
-            <a:schemeClr val="accent2"/>
-          </a:lnRef>
-          <a:fillRef idx="3">
-            <a:schemeClr val="accent2"/>
-          </a:fillRef>
-          <a:effectRef idx="3">
-            <a:schemeClr val="accent2"/>
-          </a:effectRef>
-          <a:fontRef idx="minor">
-            <a:schemeClr val="lt1"/>
-          </a:fontRef>
-        </p:style>
-        <p:txBody>
-          <a:bodyPr rtlCol="0" anchor="ctr"/>
-          <a:lstStyle/>
-          <a:p>
-            <a:pPr algn="ctr"/>
-            <a:r>
-              <a:rPr lang="en-AU" sz="2800" b="1" dirty="0">
-                <a:ln>
-                  <a:solidFill>
-                    <a:schemeClr val="bg1">
-                      <a:lumMod val="75000"/>
-                      <a:lumOff val="25000"/>
-                      <a:alpha val="10000"/>
-                    </a:schemeClr>
-                  </a:solidFill>
-                </a:ln>
-                <a:solidFill>
-                  <a:schemeClr val="tx1"/>
-                </a:solidFill>
-                <a:effectLst>
-                  <a:outerShdw blurRad="9525" dist="25400" dir="14640000" algn="tl" rotWithShape="0">
-                    <a:schemeClr val="bg1">
-                      <a:alpha val="30000"/>
-                    </a:schemeClr>
-                  </a:outerShdw>
-                </a:effectLst>
-              </a:rPr>
-              <a:t>demo</a:t>
-            </a:r>
-          </a:p>
-        </p:txBody>
-      </p:sp>
-      <p:sp>
-        <p:nvSpPr>
-          <p:cNvPr id="9" name="Title 1">
-            <a:extLst>
-              <a:ext uri="{FF2B5EF4-FFF2-40B4-BE49-F238E27FC236}">
-                <a16:creationId xmlns:a16="http://schemas.microsoft.com/office/drawing/2014/main" id="{9D0A4A63-5354-4BB5-8832-B9DB46F783E9}"/>
+          <p:cNvPr id="2" name="Title 1">
+            <a:extLst>
+              <a:ext uri="{FF2B5EF4-FFF2-40B4-BE49-F238E27FC236}">
+                <a16:creationId xmlns:a16="http://schemas.microsoft.com/office/drawing/2014/main" id="{A2E9C478-AE76-4FD5-8984-90B18062A23A}"/>
               </a:ext>
             </a:extLst>
           </p:cNvPr>
@@ -41088,8 +41537,8 @@
         </p:nvSpPr>
         <p:spPr>
           <a:xfrm>
-            <a:off x="919119" y="81280"/>
-            <a:ext cx="10353762" cy="1052094"/>
+            <a:off x="919119" y="142240"/>
+            <a:ext cx="10353762" cy="934720"/>
           </a:xfrm>
         </p:spPr>
         <p:txBody>
@@ -41100,13 +41549,78 @@
               <a:rPr lang="en-AU" dirty="0"/>
               <a:t>Malware Detection</a:t>
             </a:r>
+          </a:p>
+        </p:txBody>
+      </p:sp>
+      <p:sp>
+        <p:nvSpPr>
+          <p:cNvPr id="3" name="Content Placeholder 2">
+            <a:extLst>
+              <a:ext uri="{FF2B5EF4-FFF2-40B4-BE49-F238E27FC236}">
+                <a16:creationId xmlns:a16="http://schemas.microsoft.com/office/drawing/2014/main" id="{FF38BB1A-17C7-4CE4-80F8-423DE683961B}"/>
+              </a:ext>
+            </a:extLst>
+          </p:cNvPr>
+          <p:cNvSpPr>
+            <a:spLocks noGrp="1"/>
+          </p:cNvSpPr>
+          <p:nvPr>
+            <p:ph idx="1"/>
+          </p:nvPr>
+        </p:nvSpPr>
+        <p:spPr>
+          <a:xfrm>
+            <a:off x="710595" y="1162050"/>
+            <a:ext cx="10353762" cy="4913630"/>
+          </a:xfrm>
+        </p:spPr>
+        <p:txBody>
+          <a:bodyPr>
+            <a:normAutofit/>
+          </a:bodyPr>
+          <a:lstStyle/>
+          <a:p>
+            <a:r>
+              <a:rPr lang="en-AU" sz="3000" dirty="0"/>
+              <a:t>Ember is an AI-based signature detection tool.</a:t>
+            </a:r>
+          </a:p>
+          <a:p>
+            <a:pPr lvl="1"/>
+            <a:r>
+              <a:rPr lang="en-AU" sz="3000" dirty="0"/>
+              <a:t>It </a:t>
+            </a:r>
+            <a:r>
+              <a:rPr lang="en-AU" sz="3200" dirty="0"/>
+              <a:t>is an open-source project. </a:t>
+            </a:r>
+            <a:endParaRPr lang="en-AU" sz="3000" dirty="0"/>
+          </a:p>
+          <a:p>
+            <a:pPr lvl="1"/>
+            <a:r>
+              <a:rPr lang="en-AU" sz="3000" dirty="0"/>
+              <a:t>It uses a deep-learning-based model to predict whether a given file is malicious.</a:t>
+            </a:r>
+          </a:p>
+          <a:p>
+            <a:pPr lvl="1"/>
+            <a:r>
+              <a:rPr lang="en-AU" sz="3000" dirty="0"/>
+              <a:t>The file type is limited to windows-specific PE (portable executable). </a:t>
+            </a:r>
+          </a:p>
+          <a:p>
+            <a:pPr lvl="1"/>
+            <a:endParaRPr lang="en-AU" sz="3000" dirty="0"/>
           </a:p>
         </p:txBody>
       </p:sp>
     </p:spTree>
     <p:extLst>
       <p:ext uri="{BB962C8B-B14F-4D97-AF65-F5344CB8AC3E}">
-        <p14:creationId xmlns:p14="http://schemas.microsoft.com/office/powerpoint/2010/main" val="2038255740"/>
+        <p14:creationId xmlns:p14="http://schemas.microsoft.com/office/powerpoint/2010/main" val="835046270"/>
       </p:ext>
     </p:extLst>
   </p:cSld>
@@ -41135,10 +41649,114 @@
       </p:grpSpPr>
       <p:sp>
         <p:nvSpPr>
-          <p:cNvPr id="2" name="Title 1">
-            <a:extLst>
-              <a:ext uri="{FF2B5EF4-FFF2-40B4-BE49-F238E27FC236}">
-                <a16:creationId xmlns:a16="http://schemas.microsoft.com/office/drawing/2014/main" id="{6D96B3F8-6C7A-45B0-88C1-4B992D33F899}"/>
+          <p:cNvPr id="3" name="Slide Number Placeholder 2"/>
+          <p:cNvSpPr>
+            <a:spLocks noGrp="1"/>
+          </p:cNvSpPr>
+          <p:nvPr>
+            <p:ph type="sldNum" sz="quarter" idx="12"/>
+          </p:nvPr>
+        </p:nvSpPr>
+        <p:spPr/>
+        <p:txBody>
+          <a:bodyPr/>
+          <a:lstStyle/>
+          <a:p>
+            <a:fld id="{55670E94-029C-4BA8-8D44-FBB339E4924F}" type="slidenum">
+              <a:rPr lang="en-AU" smtClean="0">
+                <a:solidFill>
+                  <a:prstClr val="black">
+                    <a:tint val="75000"/>
+                  </a:prstClr>
+                </a:solidFill>
+              </a:rPr>
+              <a:pPr/>
+              <a:t>56</a:t>
+            </a:fld>
+            <a:endParaRPr lang="en-AU" dirty="0">
+              <a:solidFill>
+                <a:prstClr val="black">
+                  <a:tint val="75000"/>
+                </a:prstClr>
+              </a:solidFill>
+            </a:endParaRPr>
+          </a:p>
+        </p:txBody>
+      </p:sp>
+      <p:sp>
+        <p:nvSpPr>
+          <p:cNvPr id="8" name="Rounded Rectangle 10">
+            <a:extLst>
+              <a:ext uri="{FF2B5EF4-FFF2-40B4-BE49-F238E27FC236}">
+                <a16:creationId xmlns:a16="http://schemas.microsoft.com/office/drawing/2014/main" id="{EFF2A714-4BFE-4265-87E4-34F8FECB8F6F}"/>
+              </a:ext>
+            </a:extLst>
+          </p:cNvPr>
+          <p:cNvSpPr/>
+          <p:nvPr/>
+        </p:nvSpPr>
+        <p:spPr>
+          <a:xfrm>
+            <a:off x="292667" y="986987"/>
+            <a:ext cx="4325053" cy="639549"/>
+          </a:xfrm>
+          <a:prstGeom prst="roundRect">
+            <a:avLst/>
+          </a:prstGeom>
+          <a:noFill/>
+        </p:spPr>
+        <p:style>
+          <a:lnRef idx="0">
+            <a:schemeClr val="accent2"/>
+          </a:lnRef>
+          <a:fillRef idx="3">
+            <a:schemeClr val="accent2"/>
+          </a:fillRef>
+          <a:effectRef idx="3">
+            <a:schemeClr val="accent2"/>
+          </a:effectRef>
+          <a:fontRef idx="minor">
+            <a:schemeClr val="lt1"/>
+          </a:fontRef>
+        </p:style>
+        <p:txBody>
+          <a:bodyPr rtlCol="0" anchor="ctr"/>
+          <a:lstStyle/>
+          <a:p>
+            <a:pPr algn="ctr"/>
+            <a:r>
+              <a:rPr lang="en-AU" sz="2800" b="1" dirty="0">
+                <a:ln>
+                  <a:solidFill>
+                    <a:schemeClr val="bg1">
+                      <a:lumMod val="75000"/>
+                      <a:lumOff val="25000"/>
+                      <a:alpha val="10000"/>
+                    </a:schemeClr>
+                  </a:solidFill>
+                </a:ln>
+                <a:solidFill>
+                  <a:schemeClr val="tx1"/>
+                </a:solidFill>
+                <a:effectLst>
+                  <a:outerShdw blurRad="9525" dist="25400" dir="14640000" algn="tl" rotWithShape="0">
+                    <a:schemeClr val="bg1">
+                      <a:alpha val="30000"/>
+                    </a:schemeClr>
+                  </a:outerShdw>
+                </a:effectLst>
+              </a:rPr>
+              <a:t>How to run the demo</a:t>
+            </a:r>
+          </a:p>
+        </p:txBody>
+      </p:sp>
+      <p:sp>
+        <p:nvSpPr>
+          <p:cNvPr id="9" name="Title 1">
+            <a:extLst>
+              <a:ext uri="{FF2B5EF4-FFF2-40B4-BE49-F238E27FC236}">
+                <a16:creationId xmlns:a16="http://schemas.microsoft.com/office/drawing/2014/main" id="{9D0A4A63-5354-4BB5-8832-B9DB46F783E9}"/>
               </a:ext>
             </a:extLst>
           </p:cNvPr>
@@ -41151,8 +41769,8 @@
         </p:nvSpPr>
         <p:spPr>
           <a:xfrm>
-            <a:off x="913795" y="101600"/>
-            <a:ext cx="10353762" cy="1257300"/>
+            <a:off x="919119" y="81280"/>
+            <a:ext cx="10353762" cy="1052094"/>
           </a:xfrm>
         </p:spPr>
         <p:txBody>
@@ -41168,10 +41786,10 @@
       </p:sp>
       <p:sp>
         <p:nvSpPr>
-          <p:cNvPr id="3" name="Content Placeholder 2">
-            <a:extLst>
-              <a:ext uri="{FF2B5EF4-FFF2-40B4-BE49-F238E27FC236}">
-                <a16:creationId xmlns:a16="http://schemas.microsoft.com/office/drawing/2014/main" id="{A063E825-B27E-43D0-A784-C43512E937CF}"/>
+          <p:cNvPr id="12" name="Content Placeholder 2">
+            <a:extLst>
+              <a:ext uri="{FF2B5EF4-FFF2-40B4-BE49-F238E27FC236}">
+                <a16:creationId xmlns:a16="http://schemas.microsoft.com/office/drawing/2014/main" id="{C35F5975-2C76-4F59-A37E-82C404CDCDDD}"/>
               </a:ext>
             </a:extLst>
           </p:cNvPr>
@@ -41184,33 +41802,90 @@
         </p:nvSpPr>
         <p:spPr>
           <a:xfrm>
-            <a:off x="913795" y="1544320"/>
-            <a:ext cx="10353762" cy="4246879"/>
+            <a:off x="727896" y="1709687"/>
+            <a:ext cx="10353762" cy="3714749"/>
           </a:xfrm>
         </p:spPr>
         <p:txBody>
           <a:bodyPr>
-            <a:normAutofit/>
+            <a:noAutofit/>
           </a:bodyPr>
           <a:lstStyle/>
           <a:p>
             <a:r>
-              <a:rPr lang="en-AU" sz="2800" dirty="0"/>
-              <a:t>What is the main difference between Yara and Ember?</a:t>
-            </a:r>
-          </a:p>
-          <a:p>
-            <a:r>
-              <a:rPr lang="en-AU" sz="2800" dirty="0"/>
-              <a:t>What can be done to improve them?</a:t>
-            </a:r>
+              <a:rPr lang="en-US" sz="2800" dirty="0" err="1">
+                <a:solidFill>
+                  <a:schemeClr val="tx1"/>
+                </a:solidFill>
+                <a:effectLst/>
+              </a:rPr>
+              <a:t>sudo</a:t>
+            </a:r>
+            <a:r>
+              <a:rPr lang="en-US" sz="2800" dirty="0">
+                <a:solidFill>
+                  <a:schemeClr val="tx1"/>
+                </a:solidFill>
+                <a:effectLst/>
+              </a:rPr>
+              <a:t> docker run -it --rm </a:t>
+            </a:r>
+            <a:r>
+              <a:rPr lang="en-US" sz="2800" dirty="0" err="1">
+                <a:solidFill>
+                  <a:schemeClr val="tx1"/>
+                </a:solidFill>
+                <a:effectLst/>
+              </a:rPr>
+              <a:t>uwacyber</a:t>
+            </a:r>
+            <a:r>
+              <a:rPr lang="en-US" sz="2800" dirty="0">
+                <a:solidFill>
+                  <a:schemeClr val="tx1"/>
+                </a:solidFill>
+                <a:effectLst/>
+              </a:rPr>
+              <a:t>/cits1003-labs:ai-malware</a:t>
+            </a:r>
+          </a:p>
+          <a:p>
+            <a:r>
+              <a:rPr lang="en-AU" sz="2800" dirty="0">
+                <a:solidFill>
+                  <a:schemeClr val="tx1"/>
+                </a:solidFill>
+                <a:effectLst/>
+              </a:rPr>
+              <a:t>python3 scripts/classify_binaries.py -m ember_model_2018.txt /opt/malware-sample-library/Trojans/</a:t>
+            </a:r>
+            <a:r>
+              <a:rPr lang="en-AU" sz="2800" dirty="0" err="1">
+                <a:solidFill>
+                  <a:schemeClr val="tx1"/>
+                </a:solidFill>
+                <a:effectLst/>
+              </a:rPr>
+              <a:t>NanocoreRAT.bin</a:t>
+            </a:r>
+            <a:endParaRPr lang="en-AU" sz="2800" dirty="0">
+              <a:solidFill>
+                <a:schemeClr val="tx1"/>
+              </a:solidFill>
+              <a:effectLst/>
+            </a:endParaRPr>
+          </a:p>
+          <a:p>
+            <a:endParaRPr lang="en-AU" sz="2800" dirty="0">
+              <a:effectLst/>
+            </a:endParaRPr>
           </a:p>
         </p:txBody>
       </p:sp>
     </p:spTree>
     <p:extLst>
       <p:ext uri="{BB962C8B-B14F-4D97-AF65-F5344CB8AC3E}">
-        <p14:creationId xmlns:p14="http://schemas.microsoft.com/office/powerpoint/2010/main" val="3682485318"/>
+        <p14:creationId xmlns:p14="http://schemas.microsoft.com/office/powerpoint/2010/main" val="2862420244"/>
       </p:ext>
     </p:extLst>
   </p:cSld>
@@ -41239,10 +41914,114 @@
       </p:grpSpPr>
       <p:sp>
         <p:nvSpPr>
-          <p:cNvPr id="2" name="Title 1">
-            <a:extLst>
-              <a:ext uri="{FF2B5EF4-FFF2-40B4-BE49-F238E27FC236}">
-                <a16:creationId xmlns:a16="http://schemas.microsoft.com/office/drawing/2014/main" id="{6D96B3F8-6C7A-45B0-88C1-4B992D33F899}"/>
+          <p:cNvPr id="3" name="Slide Number Placeholder 2"/>
+          <p:cNvSpPr>
+            <a:spLocks noGrp="1"/>
+          </p:cNvSpPr>
+          <p:nvPr>
+            <p:ph type="sldNum" sz="quarter" idx="12"/>
+          </p:nvPr>
+        </p:nvSpPr>
+        <p:spPr/>
+        <p:txBody>
+          <a:bodyPr/>
+          <a:lstStyle/>
+          <a:p>
+            <a:fld id="{55670E94-029C-4BA8-8D44-FBB339E4924F}" type="slidenum">
+              <a:rPr lang="en-AU" smtClean="0">
+                <a:solidFill>
+                  <a:prstClr val="black">
+                    <a:tint val="75000"/>
+                  </a:prstClr>
+                </a:solidFill>
+              </a:rPr>
+              <a:pPr/>
+              <a:t>57</a:t>
+            </a:fld>
+            <a:endParaRPr lang="en-AU" dirty="0">
+              <a:solidFill>
+                <a:prstClr val="black">
+                  <a:tint val="75000"/>
+                </a:prstClr>
+              </a:solidFill>
+            </a:endParaRPr>
+          </a:p>
+        </p:txBody>
+      </p:sp>
+      <p:sp>
+        <p:nvSpPr>
+          <p:cNvPr id="8" name="Rounded Rectangle 10">
+            <a:extLst>
+              <a:ext uri="{FF2B5EF4-FFF2-40B4-BE49-F238E27FC236}">
+                <a16:creationId xmlns:a16="http://schemas.microsoft.com/office/drawing/2014/main" id="{EFF2A714-4BFE-4265-87E4-34F8FECB8F6F}"/>
+              </a:ext>
+            </a:extLst>
+          </p:cNvPr>
+          <p:cNvSpPr/>
+          <p:nvPr/>
+        </p:nvSpPr>
+        <p:spPr>
+          <a:xfrm>
+            <a:off x="292667" y="986987"/>
+            <a:ext cx="1688533" cy="639549"/>
+          </a:xfrm>
+          <a:prstGeom prst="roundRect">
+            <a:avLst/>
+          </a:prstGeom>
+          <a:noFill/>
+        </p:spPr>
+        <p:style>
+          <a:lnRef idx="0">
+            <a:schemeClr val="accent2"/>
+          </a:lnRef>
+          <a:fillRef idx="3">
+            <a:schemeClr val="accent2"/>
+          </a:fillRef>
+          <a:effectRef idx="3">
+            <a:schemeClr val="accent2"/>
+          </a:effectRef>
+          <a:fontRef idx="minor">
+            <a:schemeClr val="lt1"/>
+          </a:fontRef>
+        </p:style>
+        <p:txBody>
+          <a:bodyPr rtlCol="0" anchor="ctr"/>
+          <a:lstStyle/>
+          <a:p>
+            <a:pPr algn="ctr"/>
+            <a:r>
+              <a:rPr lang="en-AU" sz="2800" b="1" dirty="0">
+                <a:ln>
+                  <a:solidFill>
+                    <a:schemeClr val="bg1">
+                      <a:lumMod val="75000"/>
+                      <a:lumOff val="25000"/>
+                      <a:alpha val="10000"/>
+                    </a:schemeClr>
+                  </a:solidFill>
+                </a:ln>
+                <a:solidFill>
+                  <a:schemeClr val="tx1"/>
+                </a:solidFill>
+                <a:effectLst>
+                  <a:outerShdw blurRad="9525" dist="25400" dir="14640000" algn="tl" rotWithShape="0">
+                    <a:schemeClr val="bg1">
+                      <a:alpha val="30000"/>
+                    </a:schemeClr>
+                  </a:outerShdw>
+                </a:effectLst>
+              </a:rPr>
+              <a:t>demo</a:t>
+            </a:r>
+          </a:p>
+        </p:txBody>
+      </p:sp>
+      <p:sp>
+        <p:nvSpPr>
+          <p:cNvPr id="9" name="Title 1">
+            <a:extLst>
+              <a:ext uri="{FF2B5EF4-FFF2-40B4-BE49-F238E27FC236}">
+                <a16:creationId xmlns:a16="http://schemas.microsoft.com/office/drawing/2014/main" id="{9D0A4A63-5354-4BB5-8832-B9DB46F783E9}"/>
               </a:ext>
             </a:extLst>
           </p:cNvPr>
@@ -41255,8 +42034,8 @@
         </p:nvSpPr>
         <p:spPr>
           <a:xfrm>
-            <a:off x="913795" y="101600"/>
-            <a:ext cx="10353762" cy="1257300"/>
+            <a:off x="919119" y="81280"/>
+            <a:ext cx="10353762" cy="1052094"/>
           </a:xfrm>
         </p:spPr>
         <p:txBody>
@@ -41267,66 +42046,13 @@
               <a:rPr lang="en-AU" dirty="0"/>
               <a:t>Malware Detection</a:t>
             </a:r>
-          </a:p>
-        </p:txBody>
-      </p:sp>
-      <p:sp>
-        <p:nvSpPr>
-          <p:cNvPr id="3" name="Content Placeholder 2">
-            <a:extLst>
-              <a:ext uri="{FF2B5EF4-FFF2-40B4-BE49-F238E27FC236}">
-                <a16:creationId xmlns:a16="http://schemas.microsoft.com/office/drawing/2014/main" id="{A063E825-B27E-43D0-A784-C43512E937CF}"/>
-              </a:ext>
-            </a:extLst>
-          </p:cNvPr>
-          <p:cNvSpPr>
-            <a:spLocks noGrp="1"/>
-          </p:cNvSpPr>
-          <p:nvPr>
-            <p:ph idx="1"/>
-          </p:nvPr>
-        </p:nvSpPr>
-        <p:spPr>
-          <a:xfrm>
-            <a:off x="913795" y="1544320"/>
-            <a:ext cx="10353762" cy="4246879"/>
-          </a:xfrm>
-        </p:spPr>
-        <p:txBody>
-          <a:bodyPr>
-            <a:normAutofit/>
-          </a:bodyPr>
-          <a:lstStyle/>
-          <a:p>
-            <a:r>
-              <a:rPr lang="en-AU" sz="2800" dirty="0"/>
-              <a:t>What is the main difference between Yara and Ember?</a:t>
-            </a:r>
-          </a:p>
-          <a:p>
-            <a:pPr lvl="1"/>
-            <a:r>
-              <a:rPr lang="en-AU" sz="2600" dirty="0"/>
-              <a:t>e.g., Yara is rule-based while Ember is DL-based. </a:t>
-            </a:r>
-          </a:p>
-          <a:p>
-            <a:pPr lvl="1"/>
-            <a:r>
-              <a:rPr lang="en-AU" sz="2600" dirty="0"/>
-              <a:t>Yara supports multiple file types while Ember is limited to one type.</a:t>
-            </a:r>
-          </a:p>
-          <a:p>
-            <a:pPr lvl="1"/>
-            <a:endParaRPr lang="en-AU" sz="2800" dirty="0"/>
           </a:p>
         </p:txBody>
       </p:sp>
     </p:spTree>
     <p:extLst>
       <p:ext uri="{BB962C8B-B14F-4D97-AF65-F5344CB8AC3E}">
-        <p14:creationId xmlns:p14="http://schemas.microsoft.com/office/powerpoint/2010/main" val="3121942135"/>
+        <p14:creationId xmlns:p14="http://schemas.microsoft.com/office/powerpoint/2010/main" val="2038255740"/>
       </p:ext>
     </p:extLst>
   </p:cSld>
@@ -41420,35 +42146,17 @@
             </a:r>
           </a:p>
           <a:p>
-            <a:pPr lvl="1"/>
-            <a:r>
-              <a:rPr lang="en-AU" sz="2600" dirty="0"/>
-              <a:t>e.g., Yara is rule-based while Ember is DL-based. </a:t>
-            </a:r>
-          </a:p>
-          <a:p>
-            <a:pPr lvl="1"/>
-            <a:r>
-              <a:rPr lang="en-AU" sz="2600" dirty="0"/>
-              <a:t>Yara supports multiple file types while Ember is limited to one type.</a:t>
-            </a:r>
-          </a:p>
-          <a:p>
             <a:r>
               <a:rPr lang="en-AU" sz="2800" dirty="0"/>
               <a:t>What can be done to improve them?</a:t>
             </a:r>
-          </a:p>
-          <a:p>
-            <a:pPr lvl="1"/>
-            <a:endParaRPr lang="en-AU" sz="2800" dirty="0"/>
           </a:p>
         </p:txBody>
       </p:sp>
     </p:spTree>
     <p:extLst>
       <p:ext uri="{BB962C8B-B14F-4D97-AF65-F5344CB8AC3E}">
-        <p14:creationId xmlns:p14="http://schemas.microsoft.com/office/powerpoint/2010/main" val="853962288"/>
+        <p14:creationId xmlns:p14="http://schemas.microsoft.com/office/powerpoint/2010/main" val="3682485318"/>
       </p:ext>
     </p:extLst>
   </p:cSld>
@@ -41526,8 +42234,8 @@
         </p:nvSpPr>
         <p:spPr>
           <a:xfrm>
-            <a:off x="382772" y="1363178"/>
-            <a:ext cx="11182575" cy="4246879"/>
+            <a:off x="913795" y="1544320"/>
+            <a:ext cx="10353762" cy="4246879"/>
           </a:xfrm>
         </p:spPr>
         <p:txBody>
@@ -41556,26 +42264,6 @@
             </a:r>
           </a:p>
           <a:p>
-            <a:r>
-              <a:rPr lang="en-AU" sz="2800" dirty="0"/>
-              <a:t>What can be done to improve them?</a:t>
-            </a:r>
-          </a:p>
-          <a:p>
-            <a:pPr lvl="1"/>
-            <a:r>
-              <a:rPr lang="en-AU" sz="2600" dirty="0"/>
-              <a:t>e.g., Yara’s limitation: rule-based signature matching, which makes it hard to work against advanced mutation techniques. </a:t>
-            </a:r>
-          </a:p>
-          <a:p>
-            <a:pPr lvl="1"/>
-            <a:r>
-              <a:rPr lang="en-AU" sz="2600" dirty="0"/>
-              <a:t>Ember’s limitation: its dataset used to train its DNN model is outdated. </a:t>
-            </a:r>
-          </a:p>
-          <a:p>
             <a:pPr lvl="1"/>
             <a:endParaRPr lang="en-AU" sz="2800" dirty="0"/>
           </a:p>
@@ -41584,7 +42272,7 @@
     </p:spTree>
     <p:extLst>
       <p:ext uri="{BB962C8B-B14F-4D97-AF65-F5344CB8AC3E}">
-        <p14:creationId xmlns:p14="http://schemas.microsoft.com/office/powerpoint/2010/main" val="1050398790"/>
+        <p14:creationId xmlns:p14="http://schemas.microsoft.com/office/powerpoint/2010/main" val="3121942135"/>
       </p:ext>
     </p:extLst>
   </p:cSld>
@@ -41642,7 +42330,7 @@
             <a:pPr lvl="1"/>
             <a:r>
               <a:rPr lang="en-AU" sz="2600" dirty="0"/>
-              <a:t>e.g., Worm, Trojan, Ransomware, etc.</a:t>
+              <a:t>e.g., Worm, Trojan, and Ransomware.</a:t>
             </a:r>
           </a:p>
         </p:txBody>
@@ -41714,6 +42402,272 @@
     <p:extLst>
       <p:ext uri="{BB962C8B-B14F-4D97-AF65-F5344CB8AC3E}">
         <p14:creationId xmlns:p14="http://schemas.microsoft.com/office/powerpoint/2010/main" val="3454318501"/>
+      </p:ext>
+    </p:extLst>
+  </p:cSld>
+  <p:clrMapOvr>
+    <a:masterClrMapping/>
+  </p:clrMapOvr>
+</p:sld>
+</file>
+
+<file path=ppt/slides/slide60.xml><?xml version="1.0" encoding="utf-8"?>
+<p:sld xmlns:a="http://schemas.openxmlformats.org/drawingml/2006/main" xmlns:r="http://schemas.openxmlformats.org/officeDocument/2006/relationships" xmlns:p="http://schemas.openxmlformats.org/presentationml/2006/main">
+  <p:cSld>
+    <p:spTree>
+      <p:nvGrpSpPr>
+        <p:cNvPr id="1" name=""/>
+        <p:cNvGrpSpPr/>
+        <p:nvPr/>
+      </p:nvGrpSpPr>
+      <p:grpSpPr>
+        <a:xfrm>
+          <a:off x="0" y="0"/>
+          <a:ext cx="0" cy="0"/>
+          <a:chOff x="0" y="0"/>
+          <a:chExt cx="0" cy="0"/>
+        </a:xfrm>
+      </p:grpSpPr>
+      <p:sp>
+        <p:nvSpPr>
+          <p:cNvPr id="2" name="Title 1">
+            <a:extLst>
+              <a:ext uri="{FF2B5EF4-FFF2-40B4-BE49-F238E27FC236}">
+                <a16:creationId xmlns:a16="http://schemas.microsoft.com/office/drawing/2014/main" id="{6D96B3F8-6C7A-45B0-88C1-4B992D33F899}"/>
+              </a:ext>
+            </a:extLst>
+          </p:cNvPr>
+          <p:cNvSpPr>
+            <a:spLocks noGrp="1"/>
+          </p:cNvSpPr>
+          <p:nvPr>
+            <p:ph type="title"/>
+          </p:nvPr>
+        </p:nvSpPr>
+        <p:spPr>
+          <a:xfrm>
+            <a:off x="913795" y="101600"/>
+            <a:ext cx="10353762" cy="1257300"/>
+          </a:xfrm>
+        </p:spPr>
+        <p:txBody>
+          <a:bodyPr/>
+          <a:lstStyle/>
+          <a:p>
+            <a:r>
+              <a:rPr lang="en-AU" dirty="0"/>
+              <a:t>Malware Detection</a:t>
+            </a:r>
+          </a:p>
+        </p:txBody>
+      </p:sp>
+      <p:sp>
+        <p:nvSpPr>
+          <p:cNvPr id="3" name="Content Placeholder 2">
+            <a:extLst>
+              <a:ext uri="{FF2B5EF4-FFF2-40B4-BE49-F238E27FC236}">
+                <a16:creationId xmlns:a16="http://schemas.microsoft.com/office/drawing/2014/main" id="{A063E825-B27E-43D0-A784-C43512E937CF}"/>
+              </a:ext>
+            </a:extLst>
+          </p:cNvPr>
+          <p:cNvSpPr>
+            <a:spLocks noGrp="1"/>
+          </p:cNvSpPr>
+          <p:nvPr>
+            <p:ph idx="1"/>
+          </p:nvPr>
+        </p:nvSpPr>
+        <p:spPr>
+          <a:xfrm>
+            <a:off x="913795" y="1544320"/>
+            <a:ext cx="10353762" cy="4246879"/>
+          </a:xfrm>
+        </p:spPr>
+        <p:txBody>
+          <a:bodyPr>
+            <a:normAutofit/>
+          </a:bodyPr>
+          <a:lstStyle/>
+          <a:p>
+            <a:r>
+              <a:rPr lang="en-AU" sz="2800" dirty="0"/>
+              <a:t>What is the main difference between Yara and Ember?</a:t>
+            </a:r>
+          </a:p>
+          <a:p>
+            <a:pPr lvl="1"/>
+            <a:r>
+              <a:rPr lang="en-AU" sz="2600" dirty="0"/>
+              <a:t>e.g., Yara is rule-based while Ember is DL-based. </a:t>
+            </a:r>
+          </a:p>
+          <a:p>
+            <a:pPr lvl="1"/>
+            <a:r>
+              <a:rPr lang="en-AU" sz="2600" dirty="0"/>
+              <a:t>Yara supports multiple file types while Ember is limited to one type.</a:t>
+            </a:r>
+          </a:p>
+          <a:p>
+            <a:r>
+              <a:rPr lang="en-AU" sz="2800" dirty="0"/>
+              <a:t>What can be done to improve them?</a:t>
+            </a:r>
+          </a:p>
+          <a:p>
+            <a:pPr lvl="1"/>
+            <a:endParaRPr lang="en-AU" sz="2800" dirty="0"/>
+          </a:p>
+        </p:txBody>
+      </p:sp>
+    </p:spTree>
+    <p:extLst>
+      <p:ext uri="{BB962C8B-B14F-4D97-AF65-F5344CB8AC3E}">
+        <p14:creationId xmlns:p14="http://schemas.microsoft.com/office/powerpoint/2010/main" val="853962288"/>
+      </p:ext>
+    </p:extLst>
+  </p:cSld>
+  <p:clrMapOvr>
+    <a:masterClrMapping/>
+  </p:clrMapOvr>
+</p:sld>
+</file>
+
+<file path=ppt/slides/slide61.xml><?xml version="1.0" encoding="utf-8"?>
+<p:sld xmlns:a="http://schemas.openxmlformats.org/drawingml/2006/main" xmlns:r="http://schemas.openxmlformats.org/officeDocument/2006/relationships" xmlns:p="http://schemas.openxmlformats.org/presentationml/2006/main">
+  <p:cSld>
+    <p:spTree>
+      <p:nvGrpSpPr>
+        <p:cNvPr id="1" name=""/>
+        <p:cNvGrpSpPr/>
+        <p:nvPr/>
+      </p:nvGrpSpPr>
+      <p:grpSpPr>
+        <a:xfrm>
+          <a:off x="0" y="0"/>
+          <a:ext cx="0" cy="0"/>
+          <a:chOff x="0" y="0"/>
+          <a:chExt cx="0" cy="0"/>
+        </a:xfrm>
+      </p:grpSpPr>
+      <p:sp>
+        <p:nvSpPr>
+          <p:cNvPr id="2" name="Title 1">
+            <a:extLst>
+              <a:ext uri="{FF2B5EF4-FFF2-40B4-BE49-F238E27FC236}">
+                <a16:creationId xmlns:a16="http://schemas.microsoft.com/office/drawing/2014/main" id="{6D96B3F8-6C7A-45B0-88C1-4B992D33F899}"/>
+              </a:ext>
+            </a:extLst>
+          </p:cNvPr>
+          <p:cNvSpPr>
+            <a:spLocks noGrp="1"/>
+          </p:cNvSpPr>
+          <p:nvPr>
+            <p:ph type="title"/>
+          </p:nvPr>
+        </p:nvSpPr>
+        <p:spPr>
+          <a:xfrm>
+            <a:off x="913795" y="101600"/>
+            <a:ext cx="10353762" cy="1257300"/>
+          </a:xfrm>
+        </p:spPr>
+        <p:txBody>
+          <a:bodyPr/>
+          <a:lstStyle/>
+          <a:p>
+            <a:r>
+              <a:rPr lang="en-AU" dirty="0"/>
+              <a:t>Malware Detection</a:t>
+            </a:r>
+          </a:p>
+        </p:txBody>
+      </p:sp>
+      <p:sp>
+        <p:nvSpPr>
+          <p:cNvPr id="3" name="Content Placeholder 2">
+            <a:extLst>
+              <a:ext uri="{FF2B5EF4-FFF2-40B4-BE49-F238E27FC236}">
+                <a16:creationId xmlns:a16="http://schemas.microsoft.com/office/drawing/2014/main" id="{A063E825-B27E-43D0-A784-C43512E937CF}"/>
+              </a:ext>
+            </a:extLst>
+          </p:cNvPr>
+          <p:cNvSpPr>
+            <a:spLocks noGrp="1"/>
+          </p:cNvSpPr>
+          <p:nvPr>
+            <p:ph idx="1"/>
+          </p:nvPr>
+        </p:nvSpPr>
+        <p:spPr>
+          <a:xfrm>
+            <a:off x="382772" y="1363178"/>
+            <a:ext cx="11182575" cy="4246879"/>
+          </a:xfrm>
+        </p:spPr>
+        <p:txBody>
+          <a:bodyPr>
+            <a:normAutofit lnSpcReduction="10000"/>
+          </a:bodyPr>
+          <a:lstStyle/>
+          <a:p>
+            <a:r>
+              <a:rPr lang="en-AU" sz="2800" dirty="0"/>
+              <a:t>What is the main difference between Yara and Ember?</a:t>
+            </a:r>
+          </a:p>
+          <a:p>
+            <a:pPr lvl="1"/>
+            <a:r>
+              <a:rPr lang="en-AU" sz="2600" dirty="0"/>
+              <a:t>e.g., Yara is rule-based while Ember is DL-based. </a:t>
+            </a:r>
+          </a:p>
+          <a:p>
+            <a:pPr lvl="1"/>
+            <a:r>
+              <a:rPr lang="en-AU" sz="2600" dirty="0"/>
+              <a:t>Yara supports multiple file types while Ember is limited to one type.</a:t>
+            </a:r>
+          </a:p>
+          <a:p>
+            <a:r>
+              <a:rPr lang="en-AU" sz="2800" dirty="0"/>
+              <a:t>What can be done to improve them?</a:t>
+            </a:r>
+          </a:p>
+          <a:p>
+            <a:pPr lvl="1"/>
+            <a:r>
+              <a:rPr lang="en-AU" sz="2600" dirty="0"/>
+              <a:t>e.g., Yara’s limitation: rule-based signature matching, which makes it hard to work against advanced mutation techniques. </a:t>
+            </a:r>
+          </a:p>
+          <a:p>
+            <a:pPr lvl="1"/>
+            <a:r>
+              <a:rPr lang="en-AU" sz="2600" dirty="0"/>
+              <a:t>Ember’s limitation: its dataset used for DNN </a:t>
+            </a:r>
+            <a:r>
+              <a:rPr lang="en-AU" sz="2600"/>
+              <a:t>model training </a:t>
+            </a:r>
+            <a:r>
+              <a:rPr lang="en-AU" sz="2600" dirty="0"/>
+              <a:t>is outdated and it supports Windows PE only. </a:t>
+            </a:r>
+          </a:p>
+          <a:p>
+            <a:pPr lvl="1"/>
+            <a:endParaRPr lang="en-AU" sz="2800" dirty="0"/>
+          </a:p>
+        </p:txBody>
+      </p:sp>
+    </p:spTree>
+    <p:extLst>
+      <p:ext uri="{BB962C8B-B14F-4D97-AF65-F5344CB8AC3E}">
+        <p14:creationId xmlns:p14="http://schemas.microsoft.com/office/powerpoint/2010/main" val="1050398790"/>
       </p:ext>
     </p:extLst>
   </p:cSld>
@@ -41807,7 +42761,7 @@
             </a:r>
             <a:r>
               <a:rPr lang="en-US" sz="2800" dirty="0"/>
-              <a:t>appears as a legitimate program (actually containing malicious code) and relies on social engineering to deceive users into installing them. </a:t>
+              <a:t>appears as a benign program (actually containing malicious code) and relies on social engineering to deceive users into installing them. </a:t>
             </a:r>
             <a:endParaRPr lang="en-AU" sz="2800" dirty="0"/>
           </a:p>

</xml_diff>